<commit_message>
adding bones to presentation
</commit_message>
<xml_diff>
--- a/01 - Agile for Model-Based Standards Development/D - Presentations/PDES.Presentation.pptx
+++ b/01 - Agile for Model-Based Standards Development/D - Presentations/PDES.Presentation.pptx
@@ -14,10 +14,10 @@
     <p:sldId id="256" r:id="rId5"/>
     <p:sldId id="257" r:id="rId6"/>
     <p:sldId id="258" r:id="rId7"/>
-    <p:sldId id="259" r:id="rId8"/>
-    <p:sldId id="260" r:id="rId9"/>
-    <p:sldId id="261" r:id="rId10"/>
-    <p:sldId id="262" r:id="rId11"/>
+    <p:sldId id="263" r:id="rId8"/>
+    <p:sldId id="259" r:id="rId9"/>
+    <p:sldId id="260" r:id="rId10"/>
+    <p:sldId id="261" r:id="rId11"/>
   </p:sldIdLst>
   <p:sldSz cx="12188825" cy="6858000"/>
   <p:notesSz cx="7023100" cy="9309100"/>
@@ -285,7 +285,7 @@
             <a:fld id="{BE4E05A4-29A6-45AB-82C9-31FC81F0251A}" type="datetimeFigureOut">
               <a:rPr lang="en-US" smtClean="0"/>
               <a:pPr/>
-              <a:t>8/13/2019</a:t>
+              <a:t>8/15/2019</a:t>
             </a:fld>
             <a:endParaRPr lang="en-US" dirty="0"/>
           </a:p>
@@ -803,6 +803,390 @@
     </a:lvl9pPr>
   </p:notesStyle>
 </p:notesMaster>
+</file>
+
+<file path=ppt/notesSlides/notesSlide1.xml><?xml version="1.0" encoding="utf-8"?>
+<p:notes xmlns:a="http://schemas.openxmlformats.org/drawingml/2006/main" xmlns:r="http://schemas.openxmlformats.org/officeDocument/2006/relationships" xmlns:p="http://schemas.openxmlformats.org/presentationml/2006/main">
+  <p:cSld>
+    <p:spTree>
+      <p:nvGrpSpPr>
+        <p:cNvPr id="1" name=""/>
+        <p:cNvGrpSpPr/>
+        <p:nvPr/>
+      </p:nvGrpSpPr>
+      <p:grpSpPr>
+        <a:xfrm>
+          <a:off x="0" y="0"/>
+          <a:ext cx="0" cy="0"/>
+          <a:chOff x="0" y="0"/>
+          <a:chExt cx="0" cy="0"/>
+        </a:xfrm>
+      </p:grpSpPr>
+      <p:sp>
+        <p:nvSpPr>
+          <p:cNvPr id="2" name="Slide Image Placeholder 1"/>
+          <p:cNvSpPr>
+            <a:spLocks noGrp="1" noRot="1" noChangeAspect="1"/>
+          </p:cNvSpPr>
+          <p:nvPr>
+            <p:ph type="sldImg"/>
+          </p:nvPr>
+        </p:nvSpPr>
+        <p:spPr/>
+      </p:sp>
+      <p:sp>
+        <p:nvSpPr>
+          <p:cNvPr id="3" name="Notes Placeholder 2"/>
+          <p:cNvSpPr>
+            <a:spLocks noGrp="1"/>
+          </p:cNvSpPr>
+          <p:nvPr>
+            <p:ph type="body" idx="1"/>
+          </p:nvPr>
+        </p:nvSpPr>
+        <p:spPr/>
+        <p:txBody>
+          <a:bodyPr/>
+          <a:lstStyle/>
+          <a:p>
+            <a:endParaRPr lang="en-US" dirty="0"/>
+          </a:p>
+        </p:txBody>
+      </p:sp>
+      <p:sp>
+        <p:nvSpPr>
+          <p:cNvPr id="4" name="Slide Number Placeholder 3"/>
+          <p:cNvSpPr>
+            <a:spLocks noGrp="1"/>
+          </p:cNvSpPr>
+          <p:nvPr>
+            <p:ph type="sldNum" sz="quarter" idx="10"/>
+          </p:nvPr>
+        </p:nvSpPr>
+        <p:spPr/>
+        <p:txBody>
+          <a:bodyPr/>
+          <a:lstStyle/>
+          <a:p>
+            <a:fld id="{739F009B-AA83-4291-81BE-194F11CE1901}" type="slidenum">
+              <a:rPr lang="en-US" smtClean="0"/>
+              <a:pPr/>
+              <a:t>3</a:t>
+            </a:fld>
+            <a:endParaRPr lang="en-US" dirty="0"/>
+          </a:p>
+        </p:txBody>
+      </p:sp>
+    </p:spTree>
+    <p:extLst>
+      <p:ext uri="{BB962C8B-B14F-4D97-AF65-F5344CB8AC3E}">
+        <p14:creationId xmlns:p14="http://schemas.microsoft.com/office/powerpoint/2010/main" val="494030595"/>
+      </p:ext>
+    </p:extLst>
+  </p:cSld>
+  <p:clrMapOvr>
+    <a:masterClrMapping/>
+  </p:clrMapOvr>
+</p:notes>
+</file>
+
+<file path=ppt/notesSlides/notesSlide2.xml><?xml version="1.0" encoding="utf-8"?>
+<p:notes xmlns:a="http://schemas.openxmlformats.org/drawingml/2006/main" xmlns:r="http://schemas.openxmlformats.org/officeDocument/2006/relationships" xmlns:p="http://schemas.openxmlformats.org/presentationml/2006/main">
+  <p:cSld>
+    <p:spTree>
+      <p:nvGrpSpPr>
+        <p:cNvPr id="1" name=""/>
+        <p:cNvGrpSpPr/>
+        <p:nvPr/>
+      </p:nvGrpSpPr>
+      <p:grpSpPr>
+        <a:xfrm>
+          <a:off x="0" y="0"/>
+          <a:ext cx="0" cy="0"/>
+          <a:chOff x="0" y="0"/>
+          <a:chExt cx="0" cy="0"/>
+        </a:xfrm>
+      </p:grpSpPr>
+      <p:sp>
+        <p:nvSpPr>
+          <p:cNvPr id="2" name="Slide Image Placeholder 1"/>
+          <p:cNvSpPr>
+            <a:spLocks noGrp="1" noRot="1" noChangeAspect="1"/>
+          </p:cNvSpPr>
+          <p:nvPr>
+            <p:ph type="sldImg"/>
+          </p:nvPr>
+        </p:nvSpPr>
+        <p:spPr/>
+      </p:sp>
+      <p:sp>
+        <p:nvSpPr>
+          <p:cNvPr id="3" name="Notes Placeholder 2"/>
+          <p:cNvSpPr>
+            <a:spLocks noGrp="1"/>
+          </p:cNvSpPr>
+          <p:nvPr>
+            <p:ph type="body" idx="1"/>
+          </p:nvPr>
+        </p:nvSpPr>
+        <p:spPr/>
+        <p:txBody>
+          <a:bodyPr/>
+          <a:lstStyle/>
+          <a:p>
+            <a:pPr marL="0" indent="0">
+              <a:buFont typeface="Arial" panose="020B0604020202020204" pitchFamily="34" charset="0"/>
+              <a:buNone/>
+            </a:pPr>
+            <a:r>
+              <a:rPr lang="en-US" sz="1200" b="1" u="sng" kern="1200" dirty="0" smtClean="0">
+                <a:solidFill>
+                  <a:schemeClr val="tx1"/>
+                </a:solidFill>
+                <a:effectLst/>
+                <a:latin typeface="Arial" charset="0"/>
+                <a:ea typeface="+mn-ea"/>
+                <a:cs typeface="+mn-cs"/>
+              </a:rPr>
+              <a:t>Extended</a:t>
+            </a:r>
+            <a:r>
+              <a:rPr lang="en-US" sz="1200" b="1" u="sng" kern="1200" baseline="0" dirty="0" smtClean="0">
+                <a:solidFill>
+                  <a:schemeClr val="tx1"/>
+                </a:solidFill>
+                <a:effectLst/>
+                <a:latin typeface="Arial" charset="0"/>
+                <a:ea typeface="+mn-ea"/>
+                <a:cs typeface="+mn-cs"/>
+              </a:rPr>
+              <a:t> Length</a:t>
+            </a:r>
+            <a:endParaRPr lang="en-US" sz="1200" b="1" u="sng" kern="1200" dirty="0" smtClean="0">
+              <a:solidFill>
+                <a:schemeClr val="tx1"/>
+              </a:solidFill>
+              <a:effectLst/>
+              <a:latin typeface="Arial" charset="0"/>
+              <a:ea typeface="+mn-ea"/>
+              <a:cs typeface="+mn-cs"/>
+            </a:endParaRPr>
+          </a:p>
+          <a:p>
+            <a:pPr marL="171450" indent="-171450">
+              <a:buFont typeface="Arial" panose="020B0604020202020204" pitchFamily="34" charset="0"/>
+              <a:buChar char="•"/>
+            </a:pPr>
+            <a:r>
+              <a:rPr lang="en-US" sz="1200" kern="1200" dirty="0" smtClean="0">
+                <a:solidFill>
+                  <a:schemeClr val="tx1"/>
+                </a:solidFill>
+                <a:effectLst/>
+                <a:latin typeface="Arial" charset="0"/>
+                <a:ea typeface="+mn-ea"/>
+                <a:cs typeface="+mn-cs"/>
+              </a:rPr>
+              <a:t>sample across 8 standards and 16 edition publishes revealed the </a:t>
+            </a:r>
+          </a:p>
+          <a:p>
+            <a:pPr marL="171450" indent="-171450">
+              <a:buFont typeface="Arial" panose="020B0604020202020204" pitchFamily="34" charset="0"/>
+              <a:buChar char="•"/>
+            </a:pPr>
+            <a:r>
+              <a:rPr lang="en-US" sz="1200" kern="1200" dirty="0" smtClean="0">
+                <a:solidFill>
+                  <a:schemeClr val="tx1"/>
+                </a:solidFill>
+                <a:effectLst/>
+                <a:latin typeface="Arial" charset="0"/>
+                <a:ea typeface="+mn-ea"/>
+                <a:cs typeface="+mn-cs"/>
+              </a:rPr>
+              <a:t>current average project duration is 43.5 months</a:t>
+            </a:r>
+            <a:r>
+              <a:rPr lang="en-US" sz="1200" kern="1200" baseline="0" dirty="0" smtClean="0">
+                <a:solidFill>
+                  <a:schemeClr val="tx1"/>
+                </a:solidFill>
+                <a:effectLst/>
+                <a:latin typeface="Arial" charset="0"/>
+                <a:ea typeface="+mn-ea"/>
+                <a:cs typeface="+mn-cs"/>
+              </a:rPr>
+              <a:t> </a:t>
+            </a:r>
+            <a:r>
+              <a:rPr lang="en-US" sz="1200" kern="1200" dirty="0" smtClean="0">
+                <a:solidFill>
+                  <a:schemeClr val="tx1"/>
+                </a:solidFill>
+                <a:effectLst/>
+                <a:latin typeface="Arial" charset="0"/>
+                <a:ea typeface="+mn-ea"/>
+                <a:cs typeface="+mn-cs"/>
+              </a:rPr>
+              <a:t>(stage 10.99 to stage 60.60) </a:t>
+            </a:r>
+          </a:p>
+          <a:p>
+            <a:pPr marL="171450" indent="-171450">
+              <a:buFont typeface="Arial" panose="020B0604020202020204" pitchFamily="34" charset="0"/>
+              <a:buChar char="•"/>
+            </a:pPr>
+            <a:r>
+              <a:rPr lang="en-US" sz="1200" kern="1200" dirty="0" smtClean="0">
+                <a:solidFill>
+                  <a:schemeClr val="tx1"/>
+                </a:solidFill>
+                <a:effectLst/>
+                <a:latin typeface="Arial" charset="0"/>
+                <a:ea typeface="+mn-ea"/>
+                <a:cs typeface="+mn-cs"/>
+              </a:rPr>
+              <a:t>growth of 4.5 months from ed1 to ed2</a:t>
+            </a:r>
+          </a:p>
+          <a:p>
+            <a:pPr marL="171450" indent="-171450">
+              <a:buFont typeface="Arial" panose="020B0604020202020204" pitchFamily="34" charset="0"/>
+              <a:buChar char="•"/>
+            </a:pPr>
+            <a:endParaRPr lang="en-US" sz="1200" kern="1200" dirty="0" smtClean="0">
+              <a:solidFill>
+                <a:schemeClr val="tx1"/>
+              </a:solidFill>
+              <a:effectLst/>
+              <a:latin typeface="Arial" charset="0"/>
+              <a:ea typeface="+mn-ea"/>
+              <a:cs typeface="+mn-cs"/>
+            </a:endParaRPr>
+          </a:p>
+          <a:p>
+            <a:pPr marL="0" indent="0">
+              <a:buFont typeface="Arial" panose="020B0604020202020204" pitchFamily="34" charset="0"/>
+              <a:buNone/>
+            </a:pPr>
+            <a:r>
+              <a:rPr lang="en-US" sz="1200" b="1" u="sng" kern="1200" dirty="0" smtClean="0">
+                <a:solidFill>
+                  <a:schemeClr val="tx1"/>
+                </a:solidFill>
+                <a:effectLst/>
+                <a:latin typeface="Arial" charset="0"/>
+                <a:ea typeface="+mn-ea"/>
+                <a:cs typeface="+mn-cs"/>
+              </a:rPr>
+              <a:t>Quality</a:t>
+            </a:r>
+          </a:p>
+          <a:p>
+            <a:pPr marL="171450" indent="-171450">
+              <a:buFont typeface="Arial" panose="020B0604020202020204" pitchFamily="34" charset="0"/>
+              <a:buChar char="•"/>
+            </a:pPr>
+            <a:r>
+              <a:rPr lang="en-US" sz="1200" kern="1200" dirty="0" smtClean="0">
+                <a:solidFill>
+                  <a:schemeClr val="tx1"/>
+                </a:solidFill>
+                <a:effectLst/>
+                <a:latin typeface="Arial" charset="0"/>
+                <a:ea typeface="+mn-ea"/>
+                <a:cs typeface="+mn-cs"/>
+              </a:rPr>
+              <a:t>Data</a:t>
+            </a:r>
+            <a:r>
+              <a:rPr lang="en-US" sz="1200" kern="1200" baseline="0" dirty="0" smtClean="0">
+                <a:solidFill>
+                  <a:schemeClr val="tx1"/>
+                </a:solidFill>
+                <a:effectLst/>
+                <a:latin typeface="Arial" charset="0"/>
+                <a:ea typeface="+mn-ea"/>
+                <a:cs typeface="+mn-cs"/>
+              </a:rPr>
+              <a:t> Quality Issues</a:t>
+            </a:r>
+          </a:p>
+          <a:p>
+            <a:pPr marL="171450" indent="-171450">
+              <a:buFont typeface="Arial" panose="020B0604020202020204" pitchFamily="34" charset="0"/>
+              <a:buChar char="•"/>
+            </a:pPr>
+            <a:r>
+              <a:rPr lang="en-US" sz="1200" kern="1200" baseline="0" dirty="0" smtClean="0">
+                <a:solidFill>
+                  <a:schemeClr val="tx1"/>
+                </a:solidFill>
+                <a:effectLst/>
+                <a:latin typeface="Arial" charset="0"/>
+                <a:ea typeface="+mn-ea"/>
+                <a:cs typeface="+mn-cs"/>
+              </a:rPr>
+              <a:t>Incomplete Solutions</a:t>
+            </a:r>
+          </a:p>
+          <a:p>
+            <a:pPr marL="171450" indent="-171450">
+              <a:buFont typeface="Arial" panose="020B0604020202020204" pitchFamily="34" charset="0"/>
+              <a:buChar char="•"/>
+            </a:pPr>
+            <a:r>
+              <a:rPr lang="en-US" sz="1200" kern="1200" baseline="0" dirty="0" smtClean="0">
+                <a:solidFill>
+                  <a:schemeClr val="tx1"/>
+                </a:solidFill>
+                <a:effectLst/>
+                <a:latin typeface="Arial" charset="0"/>
+                <a:ea typeface="+mn-ea"/>
+                <a:cs typeface="+mn-cs"/>
+              </a:rPr>
+              <a:t>Overtly Complex/Non Implementable Solutions</a:t>
+            </a:r>
+            <a:endParaRPr lang="en-US" dirty="0"/>
+          </a:p>
+        </p:txBody>
+      </p:sp>
+      <p:sp>
+        <p:nvSpPr>
+          <p:cNvPr id="4" name="Slide Number Placeholder 3"/>
+          <p:cNvSpPr>
+            <a:spLocks noGrp="1"/>
+          </p:cNvSpPr>
+          <p:nvPr>
+            <p:ph type="sldNum" sz="quarter" idx="10"/>
+          </p:nvPr>
+        </p:nvSpPr>
+        <p:spPr/>
+        <p:txBody>
+          <a:bodyPr/>
+          <a:lstStyle/>
+          <a:p>
+            <a:fld id="{739F009B-AA83-4291-81BE-194F11CE1901}" type="slidenum">
+              <a:rPr lang="en-US" smtClean="0"/>
+              <a:pPr/>
+              <a:t>4</a:t>
+            </a:fld>
+            <a:endParaRPr lang="en-US" dirty="0"/>
+          </a:p>
+        </p:txBody>
+      </p:sp>
+    </p:spTree>
+    <p:extLst>
+      <p:ext uri="{BB962C8B-B14F-4D97-AF65-F5344CB8AC3E}">
+        <p14:creationId xmlns:p14="http://schemas.microsoft.com/office/powerpoint/2010/main" val="4022935417"/>
+      </p:ext>
+    </p:extLst>
+  </p:cSld>
+  <p:clrMapOvr>
+    <a:masterClrMapping/>
+  </p:clrMapOvr>
+</p:notes>
 </file>
 
 <file path=ppt/slideLayouts/slideLayout1.xml><?xml version="1.0" encoding="utf-8"?>
@@ -8065,30 +8449,35 @@
           <a:bodyPr/>
           <a:lstStyle/>
           <a:p>
+            <a:pPr marL="342900" indent="-342900"/>
             <a:r>
               <a:rPr lang="en-US" dirty="0" smtClean="0"/>
               <a:t>Statement of Business Need</a:t>
             </a:r>
           </a:p>
           <a:p>
+            <a:pPr marL="342900" indent="-342900"/>
             <a:r>
               <a:rPr lang="en-US" dirty="0" smtClean="0"/>
               <a:t>Problem Statement</a:t>
             </a:r>
           </a:p>
           <a:p>
+            <a:pPr marL="342900" indent="-342900"/>
             <a:r>
               <a:rPr lang="en-US" dirty="0" smtClean="0"/>
               <a:t>Proposed Solutions</a:t>
             </a:r>
           </a:p>
           <a:p>
+            <a:pPr marL="342900" indent="-342900"/>
             <a:r>
               <a:rPr lang="en-US" dirty="0" smtClean="0"/>
               <a:t>Benefits/Impacts</a:t>
             </a:r>
           </a:p>
           <a:p>
+            <a:pPr marL="342900" indent="-342900"/>
             <a:r>
               <a:rPr lang="en-US" dirty="0" smtClean="0"/>
               <a:t>Next Steps</a:t>
@@ -8177,13 +8566,289 @@
           <a:bodyPr/>
           <a:lstStyle/>
           <a:p>
-            <a:endParaRPr lang="en-GB"/>
+            <a:r>
+              <a:rPr lang="en-US" dirty="0">
+                <a:solidFill>
+                  <a:schemeClr val="bg1">
+                    <a:lumMod val="50000"/>
+                  </a:schemeClr>
+                </a:solidFill>
+              </a:rPr>
+              <a:t>Agile for Model-Based-Standards Development</a:t>
+            </a:r>
+            <a:endParaRPr lang="en-US" dirty="0">
+              <a:solidFill>
+                <a:schemeClr val="bg1">
+                  <a:lumMod val="50000"/>
+                </a:schemeClr>
+              </a:solidFill>
+            </a:endParaRPr>
           </a:p>
         </p:txBody>
       </p:sp>
       <p:sp>
         <p:nvSpPr>
-          <p:cNvPr id="4" name="Content Placeholder 3"/>
+          <p:cNvPr id="5" name="Content Placeholder 3"/>
+          <p:cNvSpPr txBox="1">
+            <a:spLocks/>
+          </p:cNvSpPr>
+          <p:nvPr/>
+        </p:nvSpPr>
+        <p:spPr bwMode="auto">
+          <a:xfrm>
+            <a:off x="6066857" y="1712091"/>
+            <a:ext cx="5601407" cy="1477328"/>
+          </a:xfrm>
+          <a:prstGeom prst="rect">
+            <a:avLst/>
+          </a:prstGeom>
+          <a:noFill/>
+          <a:ln w="9525">
+            <a:noFill/>
+            <a:miter lim="800000"/>
+            <a:headEnd/>
+            <a:tailEnd/>
+          </a:ln>
+          <a:effectLst/>
+        </p:spPr>
+        <p:txBody>
+          <a:bodyPr vert="horz" wrap="square" lIns="0" tIns="0" rIns="0" bIns="0" numCol="1" anchor="t" anchorCtr="0" compatLnSpc="1">
+            <a:prstTxWarp prst="textNoShape">
+              <a:avLst/>
+            </a:prstTxWarp>
+            <a:spAutoFit/>
+          </a:bodyPr>
+          <a:lstStyle>
+            <a:lvl1pPr marL="0" indent="0" algn="l" defTabSz="820738" rtl="0" eaLnBrk="1" fontAlgn="base" hangingPunct="1">
+              <a:lnSpc>
+                <a:spcPct val="90000"/>
+              </a:lnSpc>
+              <a:spcBef>
+                <a:spcPct val="30000"/>
+              </a:spcBef>
+              <a:spcAft>
+                <a:spcPct val="0"/>
+              </a:spcAft>
+              <a:buClr>
+                <a:schemeClr val="tx2"/>
+              </a:buClr>
+              <a:buFont typeface="Symbol" panose="05050102010706020507" pitchFamily="18" charset="2"/>
+              <a:buChar char=""/>
+              <a:defRPr sz="2000" b="1">
+                <a:solidFill>
+                  <a:schemeClr val="bg1"/>
+                </a:solidFill>
+                <a:latin typeface="+mn-lt"/>
+                <a:ea typeface="+mn-ea"/>
+                <a:cs typeface="+mn-cs"/>
+              </a:defRPr>
+            </a:lvl1pPr>
+            <a:lvl2pPr marL="288925" indent="-173038" algn="l" defTabSz="820738" rtl="0" eaLnBrk="1" fontAlgn="base" hangingPunct="1">
+              <a:lnSpc>
+                <a:spcPct val="90000"/>
+              </a:lnSpc>
+              <a:spcBef>
+                <a:spcPct val="30000"/>
+              </a:spcBef>
+              <a:spcAft>
+                <a:spcPct val="0"/>
+              </a:spcAft>
+              <a:buClr>
+                <a:schemeClr val="bg1"/>
+              </a:buClr>
+              <a:buFont typeface="Arial" panose="020B0604020202020204" pitchFamily="34" charset="0"/>
+              <a:buChar char="•"/>
+              <a:defRPr sz="2000">
+                <a:solidFill>
+                  <a:schemeClr val="bg1"/>
+                </a:solidFill>
+                <a:latin typeface="+mn-lt"/>
+              </a:defRPr>
+            </a:lvl2pPr>
+            <a:lvl3pPr marL="508000" indent="-184150" algn="l" defTabSz="820738" rtl="0" eaLnBrk="1" fontAlgn="base" hangingPunct="1">
+              <a:lnSpc>
+                <a:spcPct val="90000"/>
+              </a:lnSpc>
+              <a:spcBef>
+                <a:spcPct val="30000"/>
+              </a:spcBef>
+              <a:spcAft>
+                <a:spcPct val="0"/>
+              </a:spcAft>
+              <a:buClr>
+                <a:schemeClr val="bg1"/>
+              </a:buClr>
+              <a:buFont typeface="Arial" panose="020B0604020202020204" pitchFamily="34" charset="0"/>
+              <a:buChar char="•"/>
+              <a:defRPr>
+                <a:solidFill>
+                  <a:schemeClr val="bg1"/>
+                </a:solidFill>
+                <a:latin typeface="+mn-lt"/>
+              </a:defRPr>
+            </a:lvl3pPr>
+            <a:lvl4pPr marL="803275" indent="-225425" algn="l" defTabSz="820738" rtl="0" eaLnBrk="1" fontAlgn="base" hangingPunct="1">
+              <a:lnSpc>
+                <a:spcPct val="90000"/>
+              </a:lnSpc>
+              <a:spcBef>
+                <a:spcPct val="30000"/>
+              </a:spcBef>
+              <a:spcAft>
+                <a:spcPct val="0"/>
+              </a:spcAft>
+              <a:buClr>
+                <a:schemeClr val="bg1"/>
+              </a:buClr>
+              <a:buFont typeface="Arial" panose="020B0604020202020204" pitchFamily="34" charset="0"/>
+              <a:buChar char="•"/>
+              <a:defRPr sz="1600">
+                <a:solidFill>
+                  <a:schemeClr val="bg1"/>
+                </a:solidFill>
+                <a:latin typeface="+mn-lt"/>
+              </a:defRPr>
+            </a:lvl4pPr>
+            <a:lvl5pPr marL="957263" indent="-163513" algn="l" defTabSz="820738" rtl="0" eaLnBrk="1" fontAlgn="base" hangingPunct="1">
+              <a:lnSpc>
+                <a:spcPct val="90000"/>
+              </a:lnSpc>
+              <a:spcBef>
+                <a:spcPct val="30000"/>
+              </a:spcBef>
+              <a:spcAft>
+                <a:spcPct val="0"/>
+              </a:spcAft>
+              <a:buClr>
+                <a:schemeClr val="tx2"/>
+              </a:buClr>
+              <a:buFont typeface="Arial" charset="0"/>
+              <a:buChar char="–"/>
+              <a:defRPr sz="1600">
+                <a:solidFill>
+                  <a:schemeClr val="tx1">
+                    <a:lumMod val="75000"/>
+                    <a:lumOff val="25000"/>
+                  </a:schemeClr>
+                </a:solidFill>
+                <a:latin typeface="+mn-lt"/>
+              </a:defRPr>
+            </a:lvl5pPr>
+            <a:lvl6pPr marL="1414463" indent="-163513" algn="l" defTabSz="820738" rtl="0" eaLnBrk="1" fontAlgn="base" hangingPunct="1">
+              <a:lnSpc>
+                <a:spcPct val="90000"/>
+              </a:lnSpc>
+              <a:spcBef>
+                <a:spcPct val="30000"/>
+              </a:spcBef>
+              <a:spcAft>
+                <a:spcPct val="0"/>
+              </a:spcAft>
+              <a:buClr>
+                <a:schemeClr val="tx2"/>
+              </a:buClr>
+              <a:buFont typeface="Arial" charset="0"/>
+              <a:buChar char="–"/>
+              <a:defRPr sz="1600">
+                <a:solidFill>
+                  <a:schemeClr val="tx1"/>
+                </a:solidFill>
+                <a:latin typeface="+mn-lt"/>
+              </a:defRPr>
+            </a:lvl6pPr>
+            <a:lvl7pPr marL="1871663" indent="-163513" algn="l" defTabSz="820738" rtl="0" eaLnBrk="1" fontAlgn="base" hangingPunct="1">
+              <a:lnSpc>
+                <a:spcPct val="90000"/>
+              </a:lnSpc>
+              <a:spcBef>
+                <a:spcPct val="30000"/>
+              </a:spcBef>
+              <a:spcAft>
+                <a:spcPct val="0"/>
+              </a:spcAft>
+              <a:buClr>
+                <a:schemeClr val="tx2"/>
+              </a:buClr>
+              <a:buFont typeface="Arial" charset="0"/>
+              <a:buChar char="–"/>
+              <a:defRPr sz="1600">
+                <a:solidFill>
+                  <a:schemeClr val="tx1"/>
+                </a:solidFill>
+                <a:latin typeface="+mn-lt"/>
+              </a:defRPr>
+            </a:lvl7pPr>
+            <a:lvl8pPr marL="2328863" indent="-163513" algn="l" defTabSz="820738" rtl="0" eaLnBrk="1" fontAlgn="base" hangingPunct="1">
+              <a:lnSpc>
+                <a:spcPct val="90000"/>
+              </a:lnSpc>
+              <a:spcBef>
+                <a:spcPct val="30000"/>
+              </a:spcBef>
+              <a:spcAft>
+                <a:spcPct val="0"/>
+              </a:spcAft>
+              <a:buClr>
+                <a:schemeClr val="tx2"/>
+              </a:buClr>
+              <a:buFont typeface="Arial" charset="0"/>
+              <a:buChar char="–"/>
+              <a:defRPr sz="1600">
+                <a:solidFill>
+                  <a:schemeClr val="tx1"/>
+                </a:solidFill>
+                <a:latin typeface="+mn-lt"/>
+              </a:defRPr>
+            </a:lvl8pPr>
+            <a:lvl9pPr marL="2786063" indent="-163513" algn="l" defTabSz="820738" rtl="0" eaLnBrk="1" fontAlgn="base" hangingPunct="1">
+              <a:lnSpc>
+                <a:spcPct val="90000"/>
+              </a:lnSpc>
+              <a:spcBef>
+                <a:spcPct val="30000"/>
+              </a:spcBef>
+              <a:spcAft>
+                <a:spcPct val="0"/>
+              </a:spcAft>
+              <a:buClr>
+                <a:schemeClr val="tx2"/>
+              </a:buClr>
+              <a:buFont typeface="Arial" charset="0"/>
+              <a:buChar char="–"/>
+              <a:defRPr sz="1600">
+                <a:solidFill>
+                  <a:schemeClr val="tx1"/>
+                </a:solidFill>
+                <a:latin typeface="+mn-lt"/>
+              </a:defRPr>
+            </a:lvl9pPr>
+          </a:lstStyle>
+          <a:p>
+            <a:pPr marL="171450" indent="-171450"/>
+            <a:r>
+              <a:rPr lang="en-US" sz="1600" kern="0" dirty="0" smtClean="0"/>
+              <a:t>Information requirements are not represented in the standard (i.e. gaps)</a:t>
+            </a:r>
+          </a:p>
+          <a:p>
+            <a:pPr marL="171450" indent="-171450"/>
+            <a:r>
+              <a:rPr lang="en-US" sz="1600" kern="0" dirty="0" smtClean="0"/>
+              <a:t>Time to reduce gaps (standards development) is not keeping with the speed of business need</a:t>
+            </a:r>
+          </a:p>
+          <a:p>
+            <a:pPr marL="171450" indent="-171450"/>
+            <a:r>
+              <a:rPr lang="en-US" sz="1600" kern="0" dirty="0" smtClean="0"/>
+              <a:t>Interim interoperability cause non-value added costs to the business to:</a:t>
+            </a:r>
+          </a:p>
+        </p:txBody>
+      </p:sp>
+      <p:sp>
+        <p:nvSpPr>
+          <p:cNvPr id="6" name="Content Placeholder 3"/>
           <p:cNvSpPr>
             <a:spLocks noGrp="1"/>
           </p:cNvSpPr>
@@ -8191,12 +8856,622 @@
             <p:ph sz="quarter" idx="16"/>
           </p:nvPr>
         </p:nvSpPr>
-        <p:spPr/>
+        <p:spPr>
+          <a:xfrm>
+            <a:off x="405383" y="1283208"/>
+            <a:ext cx="5601407" cy="276999"/>
+          </a:xfrm>
+        </p:spPr>
         <p:txBody>
           <a:bodyPr/>
           <a:lstStyle/>
           <a:p>
-            <a:endParaRPr lang="en-GB"/>
+            <a:r>
+              <a:rPr lang="en-US" dirty="0" smtClean="0"/>
+              <a:t>Business Scenarios</a:t>
+            </a:r>
+            <a:endParaRPr lang="en-US" dirty="0"/>
+          </a:p>
+        </p:txBody>
+      </p:sp>
+      <p:sp>
+        <p:nvSpPr>
+          <p:cNvPr id="7" name="Content Placeholder 3"/>
+          <p:cNvSpPr txBox="1">
+            <a:spLocks/>
+          </p:cNvSpPr>
+          <p:nvPr/>
+        </p:nvSpPr>
+        <p:spPr bwMode="auto">
+          <a:xfrm>
+            <a:off x="6204017" y="1283208"/>
+            <a:ext cx="5601407" cy="276999"/>
+          </a:xfrm>
+          <a:prstGeom prst="rect">
+            <a:avLst/>
+          </a:prstGeom>
+          <a:solidFill>
+            <a:schemeClr val="tx1">
+              <a:lumMod val="75000"/>
+              <a:lumOff val="25000"/>
+            </a:schemeClr>
+          </a:solidFill>
+          <a:ln w="9525">
+            <a:noFill/>
+            <a:miter lim="800000"/>
+            <a:headEnd/>
+            <a:tailEnd/>
+          </a:ln>
+          <a:effectLst/>
+        </p:spPr>
+        <p:txBody>
+          <a:bodyPr vert="horz" wrap="square" lIns="0" tIns="0" rIns="0" bIns="0" numCol="1" anchor="t" anchorCtr="0" compatLnSpc="1">
+            <a:prstTxWarp prst="textNoShape">
+              <a:avLst/>
+            </a:prstTxWarp>
+            <a:spAutoFit/>
+          </a:bodyPr>
+          <a:lstStyle>
+            <a:lvl1pPr marL="0" indent="0" algn="l" defTabSz="820738" rtl="0" eaLnBrk="1" fontAlgn="base" hangingPunct="1">
+              <a:lnSpc>
+                <a:spcPct val="90000"/>
+              </a:lnSpc>
+              <a:spcBef>
+                <a:spcPct val="30000"/>
+              </a:spcBef>
+              <a:spcAft>
+                <a:spcPct val="0"/>
+              </a:spcAft>
+              <a:buClr>
+                <a:schemeClr val="tx2"/>
+              </a:buClr>
+              <a:buFont typeface="Symbol" panose="05050102010706020507" pitchFamily="18" charset="2"/>
+              <a:buChar char=""/>
+              <a:defRPr sz="2000" b="1">
+                <a:solidFill>
+                  <a:schemeClr val="bg1"/>
+                </a:solidFill>
+                <a:latin typeface="+mn-lt"/>
+                <a:ea typeface="+mn-ea"/>
+                <a:cs typeface="+mn-cs"/>
+              </a:defRPr>
+            </a:lvl1pPr>
+            <a:lvl2pPr marL="288925" indent="-173038" algn="l" defTabSz="820738" rtl="0" eaLnBrk="1" fontAlgn="base" hangingPunct="1">
+              <a:lnSpc>
+                <a:spcPct val="90000"/>
+              </a:lnSpc>
+              <a:spcBef>
+                <a:spcPct val="30000"/>
+              </a:spcBef>
+              <a:spcAft>
+                <a:spcPct val="0"/>
+              </a:spcAft>
+              <a:buClr>
+                <a:schemeClr val="bg1"/>
+              </a:buClr>
+              <a:buFont typeface="Arial" panose="020B0604020202020204" pitchFamily="34" charset="0"/>
+              <a:buChar char="•"/>
+              <a:defRPr sz="2000">
+                <a:solidFill>
+                  <a:schemeClr val="bg1"/>
+                </a:solidFill>
+                <a:latin typeface="+mn-lt"/>
+              </a:defRPr>
+            </a:lvl2pPr>
+            <a:lvl3pPr marL="508000" indent="-184150" algn="l" defTabSz="820738" rtl="0" eaLnBrk="1" fontAlgn="base" hangingPunct="1">
+              <a:lnSpc>
+                <a:spcPct val="90000"/>
+              </a:lnSpc>
+              <a:spcBef>
+                <a:spcPct val="30000"/>
+              </a:spcBef>
+              <a:spcAft>
+                <a:spcPct val="0"/>
+              </a:spcAft>
+              <a:buClr>
+                <a:schemeClr val="bg1"/>
+              </a:buClr>
+              <a:buFont typeface="Arial" panose="020B0604020202020204" pitchFamily="34" charset="0"/>
+              <a:buChar char="•"/>
+              <a:defRPr>
+                <a:solidFill>
+                  <a:schemeClr val="bg1"/>
+                </a:solidFill>
+                <a:latin typeface="+mn-lt"/>
+              </a:defRPr>
+            </a:lvl3pPr>
+            <a:lvl4pPr marL="803275" indent="-225425" algn="l" defTabSz="820738" rtl="0" eaLnBrk="1" fontAlgn="base" hangingPunct="1">
+              <a:lnSpc>
+                <a:spcPct val="90000"/>
+              </a:lnSpc>
+              <a:spcBef>
+                <a:spcPct val="30000"/>
+              </a:spcBef>
+              <a:spcAft>
+                <a:spcPct val="0"/>
+              </a:spcAft>
+              <a:buClr>
+                <a:schemeClr val="bg1"/>
+              </a:buClr>
+              <a:buFont typeface="Arial" panose="020B0604020202020204" pitchFamily="34" charset="0"/>
+              <a:buChar char="•"/>
+              <a:defRPr sz="1600">
+                <a:solidFill>
+                  <a:schemeClr val="bg1"/>
+                </a:solidFill>
+                <a:latin typeface="+mn-lt"/>
+              </a:defRPr>
+            </a:lvl4pPr>
+            <a:lvl5pPr marL="957263" indent="-163513" algn="l" defTabSz="820738" rtl="0" eaLnBrk="1" fontAlgn="base" hangingPunct="1">
+              <a:lnSpc>
+                <a:spcPct val="90000"/>
+              </a:lnSpc>
+              <a:spcBef>
+                <a:spcPct val="30000"/>
+              </a:spcBef>
+              <a:spcAft>
+                <a:spcPct val="0"/>
+              </a:spcAft>
+              <a:buClr>
+                <a:schemeClr val="tx2"/>
+              </a:buClr>
+              <a:buFont typeface="Arial" charset="0"/>
+              <a:buChar char="–"/>
+              <a:defRPr sz="1600">
+                <a:solidFill>
+                  <a:schemeClr val="tx1">
+                    <a:lumMod val="75000"/>
+                    <a:lumOff val="25000"/>
+                  </a:schemeClr>
+                </a:solidFill>
+                <a:latin typeface="+mn-lt"/>
+              </a:defRPr>
+            </a:lvl5pPr>
+            <a:lvl6pPr marL="1414463" indent="-163513" algn="l" defTabSz="820738" rtl="0" eaLnBrk="1" fontAlgn="base" hangingPunct="1">
+              <a:lnSpc>
+                <a:spcPct val="90000"/>
+              </a:lnSpc>
+              <a:spcBef>
+                <a:spcPct val="30000"/>
+              </a:spcBef>
+              <a:spcAft>
+                <a:spcPct val="0"/>
+              </a:spcAft>
+              <a:buClr>
+                <a:schemeClr val="tx2"/>
+              </a:buClr>
+              <a:buFont typeface="Arial" charset="0"/>
+              <a:buChar char="–"/>
+              <a:defRPr sz="1600">
+                <a:solidFill>
+                  <a:schemeClr val="tx1"/>
+                </a:solidFill>
+                <a:latin typeface="+mn-lt"/>
+              </a:defRPr>
+            </a:lvl6pPr>
+            <a:lvl7pPr marL="1871663" indent="-163513" algn="l" defTabSz="820738" rtl="0" eaLnBrk="1" fontAlgn="base" hangingPunct="1">
+              <a:lnSpc>
+                <a:spcPct val="90000"/>
+              </a:lnSpc>
+              <a:spcBef>
+                <a:spcPct val="30000"/>
+              </a:spcBef>
+              <a:spcAft>
+                <a:spcPct val="0"/>
+              </a:spcAft>
+              <a:buClr>
+                <a:schemeClr val="tx2"/>
+              </a:buClr>
+              <a:buFont typeface="Arial" charset="0"/>
+              <a:buChar char="–"/>
+              <a:defRPr sz="1600">
+                <a:solidFill>
+                  <a:schemeClr val="tx1"/>
+                </a:solidFill>
+                <a:latin typeface="+mn-lt"/>
+              </a:defRPr>
+            </a:lvl7pPr>
+            <a:lvl8pPr marL="2328863" indent="-163513" algn="l" defTabSz="820738" rtl="0" eaLnBrk="1" fontAlgn="base" hangingPunct="1">
+              <a:lnSpc>
+                <a:spcPct val="90000"/>
+              </a:lnSpc>
+              <a:spcBef>
+                <a:spcPct val="30000"/>
+              </a:spcBef>
+              <a:spcAft>
+                <a:spcPct val="0"/>
+              </a:spcAft>
+              <a:buClr>
+                <a:schemeClr val="tx2"/>
+              </a:buClr>
+              <a:buFont typeface="Arial" charset="0"/>
+              <a:buChar char="–"/>
+              <a:defRPr sz="1600">
+                <a:solidFill>
+                  <a:schemeClr val="tx1"/>
+                </a:solidFill>
+                <a:latin typeface="+mn-lt"/>
+              </a:defRPr>
+            </a:lvl8pPr>
+            <a:lvl9pPr marL="2786063" indent="-163513" algn="l" defTabSz="820738" rtl="0" eaLnBrk="1" fontAlgn="base" hangingPunct="1">
+              <a:lnSpc>
+                <a:spcPct val="90000"/>
+              </a:lnSpc>
+              <a:spcBef>
+                <a:spcPct val="30000"/>
+              </a:spcBef>
+              <a:spcAft>
+                <a:spcPct val="0"/>
+              </a:spcAft>
+              <a:buClr>
+                <a:schemeClr val="tx2"/>
+              </a:buClr>
+              <a:buFont typeface="Arial" charset="0"/>
+              <a:buChar char="–"/>
+              <a:defRPr sz="1600">
+                <a:solidFill>
+                  <a:schemeClr val="tx1"/>
+                </a:solidFill>
+                <a:latin typeface="+mn-lt"/>
+              </a:defRPr>
+            </a:lvl9pPr>
+          </a:lstStyle>
+          <a:p>
+            <a:r>
+              <a:rPr lang="en-US" kern="0" dirty="0" smtClean="0"/>
+              <a:t>Business Consequences</a:t>
+            </a:r>
+            <a:endParaRPr lang="en-US" kern="0" dirty="0"/>
+          </a:p>
+        </p:txBody>
+      </p:sp>
+      <p:sp>
+        <p:nvSpPr>
+          <p:cNvPr id="8" name="Content Placeholder 3"/>
+          <p:cNvSpPr txBox="1">
+            <a:spLocks/>
+          </p:cNvSpPr>
+          <p:nvPr/>
+        </p:nvSpPr>
+        <p:spPr bwMode="auto">
+          <a:xfrm>
+            <a:off x="256793" y="1712091"/>
+            <a:ext cx="5601407" cy="1034129"/>
+          </a:xfrm>
+          <a:prstGeom prst="rect">
+            <a:avLst/>
+          </a:prstGeom>
+          <a:solidFill>
+            <a:schemeClr val="tx1">
+              <a:lumMod val="75000"/>
+              <a:lumOff val="25000"/>
+            </a:schemeClr>
+          </a:solidFill>
+          <a:ln w="9525">
+            <a:noFill/>
+            <a:miter lim="800000"/>
+            <a:headEnd/>
+            <a:tailEnd/>
+          </a:ln>
+          <a:effectLst/>
+        </p:spPr>
+        <p:txBody>
+          <a:bodyPr vert="horz" wrap="square" lIns="0" tIns="0" rIns="0" bIns="0" numCol="1" anchor="t" anchorCtr="0" compatLnSpc="1">
+            <a:prstTxWarp prst="textNoShape">
+              <a:avLst/>
+            </a:prstTxWarp>
+            <a:spAutoFit/>
+          </a:bodyPr>
+          <a:lstStyle>
+            <a:lvl1pPr marL="0" indent="0" algn="l" defTabSz="820738" rtl="0" eaLnBrk="1" fontAlgn="base" hangingPunct="1">
+              <a:lnSpc>
+                <a:spcPct val="90000"/>
+              </a:lnSpc>
+              <a:spcBef>
+                <a:spcPct val="30000"/>
+              </a:spcBef>
+              <a:spcAft>
+                <a:spcPct val="0"/>
+              </a:spcAft>
+              <a:buClr>
+                <a:schemeClr val="tx2"/>
+              </a:buClr>
+              <a:buFont typeface="Symbol" panose="05050102010706020507" pitchFamily="18" charset="2"/>
+              <a:buChar char=""/>
+              <a:defRPr sz="2000" b="1">
+                <a:solidFill>
+                  <a:schemeClr val="bg1"/>
+                </a:solidFill>
+                <a:latin typeface="+mn-lt"/>
+                <a:ea typeface="+mn-ea"/>
+                <a:cs typeface="+mn-cs"/>
+              </a:defRPr>
+            </a:lvl1pPr>
+            <a:lvl2pPr marL="288925" indent="-173038" algn="l" defTabSz="820738" rtl="0" eaLnBrk="1" fontAlgn="base" hangingPunct="1">
+              <a:lnSpc>
+                <a:spcPct val="90000"/>
+              </a:lnSpc>
+              <a:spcBef>
+                <a:spcPct val="30000"/>
+              </a:spcBef>
+              <a:spcAft>
+                <a:spcPct val="0"/>
+              </a:spcAft>
+              <a:buClr>
+                <a:schemeClr val="bg1"/>
+              </a:buClr>
+              <a:buFont typeface="Arial" panose="020B0604020202020204" pitchFamily="34" charset="0"/>
+              <a:buChar char="•"/>
+              <a:defRPr sz="2000">
+                <a:solidFill>
+                  <a:schemeClr val="bg1"/>
+                </a:solidFill>
+                <a:latin typeface="+mn-lt"/>
+              </a:defRPr>
+            </a:lvl2pPr>
+            <a:lvl3pPr marL="508000" indent="-184150" algn="l" defTabSz="820738" rtl="0" eaLnBrk="1" fontAlgn="base" hangingPunct="1">
+              <a:lnSpc>
+                <a:spcPct val="90000"/>
+              </a:lnSpc>
+              <a:spcBef>
+                <a:spcPct val="30000"/>
+              </a:spcBef>
+              <a:spcAft>
+                <a:spcPct val="0"/>
+              </a:spcAft>
+              <a:buClr>
+                <a:schemeClr val="bg1"/>
+              </a:buClr>
+              <a:buFont typeface="Arial" panose="020B0604020202020204" pitchFamily="34" charset="0"/>
+              <a:buChar char="•"/>
+              <a:defRPr>
+                <a:solidFill>
+                  <a:schemeClr val="bg1"/>
+                </a:solidFill>
+                <a:latin typeface="+mn-lt"/>
+              </a:defRPr>
+            </a:lvl3pPr>
+            <a:lvl4pPr marL="803275" indent="-225425" algn="l" defTabSz="820738" rtl="0" eaLnBrk="1" fontAlgn="base" hangingPunct="1">
+              <a:lnSpc>
+                <a:spcPct val="90000"/>
+              </a:lnSpc>
+              <a:spcBef>
+                <a:spcPct val="30000"/>
+              </a:spcBef>
+              <a:spcAft>
+                <a:spcPct val="0"/>
+              </a:spcAft>
+              <a:buClr>
+                <a:schemeClr val="bg1"/>
+              </a:buClr>
+              <a:buFont typeface="Arial" panose="020B0604020202020204" pitchFamily="34" charset="0"/>
+              <a:buChar char="•"/>
+              <a:defRPr sz="1600">
+                <a:solidFill>
+                  <a:schemeClr val="bg1"/>
+                </a:solidFill>
+                <a:latin typeface="+mn-lt"/>
+              </a:defRPr>
+            </a:lvl4pPr>
+            <a:lvl5pPr marL="957263" indent="-163513" algn="l" defTabSz="820738" rtl="0" eaLnBrk="1" fontAlgn="base" hangingPunct="1">
+              <a:lnSpc>
+                <a:spcPct val="90000"/>
+              </a:lnSpc>
+              <a:spcBef>
+                <a:spcPct val="30000"/>
+              </a:spcBef>
+              <a:spcAft>
+                <a:spcPct val="0"/>
+              </a:spcAft>
+              <a:buClr>
+                <a:schemeClr val="tx2"/>
+              </a:buClr>
+              <a:buFont typeface="Arial" charset="0"/>
+              <a:buChar char="–"/>
+              <a:defRPr sz="1600">
+                <a:solidFill>
+                  <a:schemeClr val="tx1">
+                    <a:lumMod val="75000"/>
+                    <a:lumOff val="25000"/>
+                  </a:schemeClr>
+                </a:solidFill>
+                <a:latin typeface="+mn-lt"/>
+              </a:defRPr>
+            </a:lvl5pPr>
+            <a:lvl6pPr marL="1414463" indent="-163513" algn="l" defTabSz="820738" rtl="0" eaLnBrk="1" fontAlgn="base" hangingPunct="1">
+              <a:lnSpc>
+                <a:spcPct val="90000"/>
+              </a:lnSpc>
+              <a:spcBef>
+                <a:spcPct val="30000"/>
+              </a:spcBef>
+              <a:spcAft>
+                <a:spcPct val="0"/>
+              </a:spcAft>
+              <a:buClr>
+                <a:schemeClr val="tx2"/>
+              </a:buClr>
+              <a:buFont typeface="Arial" charset="0"/>
+              <a:buChar char="–"/>
+              <a:defRPr sz="1600">
+                <a:solidFill>
+                  <a:schemeClr val="tx1"/>
+                </a:solidFill>
+                <a:latin typeface="+mn-lt"/>
+              </a:defRPr>
+            </a:lvl6pPr>
+            <a:lvl7pPr marL="1871663" indent="-163513" algn="l" defTabSz="820738" rtl="0" eaLnBrk="1" fontAlgn="base" hangingPunct="1">
+              <a:lnSpc>
+                <a:spcPct val="90000"/>
+              </a:lnSpc>
+              <a:spcBef>
+                <a:spcPct val="30000"/>
+              </a:spcBef>
+              <a:spcAft>
+                <a:spcPct val="0"/>
+              </a:spcAft>
+              <a:buClr>
+                <a:schemeClr val="tx2"/>
+              </a:buClr>
+              <a:buFont typeface="Arial" charset="0"/>
+              <a:buChar char="–"/>
+              <a:defRPr sz="1600">
+                <a:solidFill>
+                  <a:schemeClr val="tx1"/>
+                </a:solidFill>
+                <a:latin typeface="+mn-lt"/>
+              </a:defRPr>
+            </a:lvl7pPr>
+            <a:lvl8pPr marL="2328863" indent="-163513" algn="l" defTabSz="820738" rtl="0" eaLnBrk="1" fontAlgn="base" hangingPunct="1">
+              <a:lnSpc>
+                <a:spcPct val="90000"/>
+              </a:lnSpc>
+              <a:spcBef>
+                <a:spcPct val="30000"/>
+              </a:spcBef>
+              <a:spcAft>
+                <a:spcPct val="0"/>
+              </a:spcAft>
+              <a:buClr>
+                <a:schemeClr val="tx2"/>
+              </a:buClr>
+              <a:buFont typeface="Arial" charset="0"/>
+              <a:buChar char="–"/>
+              <a:defRPr sz="1600">
+                <a:solidFill>
+                  <a:schemeClr val="tx1"/>
+                </a:solidFill>
+                <a:latin typeface="+mn-lt"/>
+              </a:defRPr>
+            </a:lvl8pPr>
+            <a:lvl9pPr marL="2786063" indent="-163513" algn="l" defTabSz="820738" rtl="0" eaLnBrk="1" fontAlgn="base" hangingPunct="1">
+              <a:lnSpc>
+                <a:spcPct val="90000"/>
+              </a:lnSpc>
+              <a:spcBef>
+                <a:spcPct val="30000"/>
+              </a:spcBef>
+              <a:spcAft>
+                <a:spcPct val="0"/>
+              </a:spcAft>
+              <a:buClr>
+                <a:schemeClr val="tx2"/>
+              </a:buClr>
+              <a:buFont typeface="Arial" charset="0"/>
+              <a:buChar char="–"/>
+              <a:defRPr sz="1600">
+                <a:solidFill>
+                  <a:schemeClr val="tx1"/>
+                </a:solidFill>
+                <a:latin typeface="+mn-lt"/>
+              </a:defRPr>
+            </a:lvl9pPr>
+          </a:lstStyle>
+          <a:p>
+            <a:pPr marL="171450" indent="-171450"/>
+            <a:r>
+              <a:rPr lang="en-US" sz="1600" kern="0" dirty="0" smtClean="0"/>
+              <a:t>OEM Submission of Technical Data Package to Authority for Certification</a:t>
+            </a:r>
+          </a:p>
+          <a:p>
+            <a:pPr marL="171450" indent="-171450"/>
+            <a:r>
+              <a:rPr lang="en-US" sz="1600" kern="0" dirty="0" smtClean="0"/>
+              <a:t>Manufacturing and Support Enablement</a:t>
+            </a:r>
+          </a:p>
+          <a:p>
+            <a:pPr marL="171450" indent="-171450"/>
+            <a:r>
+              <a:rPr lang="en-US" sz="1600" kern="0" dirty="0" smtClean="0"/>
+              <a:t>Design Integration</a:t>
+            </a:r>
+            <a:endParaRPr lang="en-US" sz="1600" kern="0" dirty="0"/>
+          </a:p>
+        </p:txBody>
+      </p:sp>
+      <p:sp>
+        <p:nvSpPr>
+          <p:cNvPr id="15" name="TextBox 14"/>
+          <p:cNvSpPr txBox="1"/>
+          <p:nvPr/>
+        </p:nvSpPr>
+        <p:spPr>
+          <a:xfrm>
+            <a:off x="6217920" y="3425093"/>
+            <a:ext cx="5657850" cy="830997"/>
+          </a:xfrm>
+          <a:prstGeom prst="rect">
+            <a:avLst/>
+          </a:prstGeom>
+          <a:noFill/>
+        </p:spPr>
+        <p:txBody>
+          <a:bodyPr wrap="square" numCol="2" rtlCol="0">
+            <a:spAutoFit/>
+          </a:bodyPr>
+          <a:lstStyle/>
+          <a:p>
+            <a:pPr marL="285750" indent="-285750">
+              <a:buFont typeface="Arial" panose="020B0604020202020204" pitchFamily="34" charset="0"/>
+              <a:buChar char="•"/>
+            </a:pPr>
+            <a:r>
+              <a:rPr lang="en-US" sz="1600" dirty="0" smtClean="0">
+                <a:solidFill>
+                  <a:schemeClr val="bg1"/>
+                </a:solidFill>
+              </a:rPr>
+              <a:t>Manual re-entry and remodeling</a:t>
+            </a:r>
+          </a:p>
+          <a:p>
+            <a:pPr marL="285750" indent="-285750">
+              <a:buFont typeface="Arial" panose="020B0604020202020204" pitchFamily="34" charset="0"/>
+              <a:buChar char="•"/>
+            </a:pPr>
+            <a:r>
+              <a:rPr lang="en-US" sz="1600" dirty="0" smtClean="0">
+                <a:solidFill>
+                  <a:schemeClr val="bg1"/>
+                </a:solidFill>
+              </a:rPr>
+              <a:t>Conversion cleanup</a:t>
+            </a:r>
+          </a:p>
+          <a:p>
+            <a:pPr marL="285750" indent="-285750">
+              <a:buFont typeface="Arial" panose="020B0604020202020204" pitchFamily="34" charset="0"/>
+              <a:buChar char="•"/>
+            </a:pPr>
+            <a:r>
+              <a:rPr lang="en-US" sz="1600" dirty="0" smtClean="0">
+                <a:solidFill>
+                  <a:schemeClr val="bg1"/>
+                </a:solidFill>
+              </a:rPr>
+              <a:t>Cost of maintaining multiple CAD licenses</a:t>
+            </a:r>
+          </a:p>
+          <a:p>
+            <a:pPr marL="285750" indent="-285750">
+              <a:buFont typeface="Arial" panose="020B0604020202020204" pitchFamily="34" charset="0"/>
+              <a:buChar char="•"/>
+            </a:pPr>
+            <a:r>
+              <a:rPr lang="en-US" sz="1600" dirty="0" smtClean="0">
+                <a:solidFill>
+                  <a:schemeClr val="bg1"/>
+                </a:solidFill>
+              </a:rPr>
+              <a:t>Supplier assertion costs</a:t>
+            </a:r>
+            <a:endParaRPr lang="en-US" sz="1600" dirty="0">
+              <a:solidFill>
+                <a:schemeClr val="bg1"/>
+              </a:solidFill>
+            </a:endParaRPr>
           </a:p>
         </p:txBody>
       </p:sp>
@@ -8244,6 +9519,295 @@
       </p:grpSpPr>
       <p:sp>
         <p:nvSpPr>
+          <p:cNvPr id="7" name="Content Placeholder 3"/>
+          <p:cNvSpPr txBox="1">
+            <a:spLocks/>
+          </p:cNvSpPr>
+          <p:nvPr/>
+        </p:nvSpPr>
+        <p:spPr bwMode="auto">
+          <a:xfrm>
+            <a:off x="6204017" y="4802532"/>
+            <a:ext cx="5601407" cy="1495794"/>
+          </a:xfrm>
+          <a:prstGeom prst="rect">
+            <a:avLst/>
+          </a:prstGeom>
+          <a:noFill/>
+          <a:ln w="9525">
+            <a:noFill/>
+            <a:miter lim="800000"/>
+            <a:headEnd/>
+            <a:tailEnd/>
+          </a:ln>
+          <a:effectLst/>
+        </p:spPr>
+        <p:txBody>
+          <a:bodyPr vert="horz" wrap="square" lIns="0" tIns="0" rIns="0" bIns="0" numCol="1" anchor="t" anchorCtr="0" compatLnSpc="1">
+            <a:prstTxWarp prst="textNoShape">
+              <a:avLst/>
+            </a:prstTxWarp>
+            <a:spAutoFit/>
+          </a:bodyPr>
+          <a:lstStyle>
+            <a:lvl1pPr marL="0" indent="0" algn="l" defTabSz="820738" rtl="0" eaLnBrk="1" fontAlgn="base" hangingPunct="1">
+              <a:lnSpc>
+                <a:spcPct val="90000"/>
+              </a:lnSpc>
+              <a:spcBef>
+                <a:spcPct val="30000"/>
+              </a:spcBef>
+              <a:spcAft>
+                <a:spcPct val="0"/>
+              </a:spcAft>
+              <a:buClr>
+                <a:schemeClr val="tx2"/>
+              </a:buClr>
+              <a:buFont typeface="Symbol" panose="05050102010706020507" pitchFamily="18" charset="2"/>
+              <a:buChar char=""/>
+              <a:defRPr sz="2000" b="1">
+                <a:solidFill>
+                  <a:schemeClr val="bg1"/>
+                </a:solidFill>
+                <a:latin typeface="+mn-lt"/>
+                <a:ea typeface="+mn-ea"/>
+                <a:cs typeface="+mn-cs"/>
+              </a:defRPr>
+            </a:lvl1pPr>
+            <a:lvl2pPr marL="288925" indent="-173038" algn="l" defTabSz="820738" rtl="0" eaLnBrk="1" fontAlgn="base" hangingPunct="1">
+              <a:lnSpc>
+                <a:spcPct val="90000"/>
+              </a:lnSpc>
+              <a:spcBef>
+                <a:spcPct val="30000"/>
+              </a:spcBef>
+              <a:spcAft>
+                <a:spcPct val="0"/>
+              </a:spcAft>
+              <a:buClr>
+                <a:schemeClr val="bg1"/>
+              </a:buClr>
+              <a:buFont typeface="Arial" panose="020B0604020202020204" pitchFamily="34" charset="0"/>
+              <a:buChar char="•"/>
+              <a:defRPr sz="2000">
+                <a:solidFill>
+                  <a:schemeClr val="bg1"/>
+                </a:solidFill>
+                <a:latin typeface="+mn-lt"/>
+              </a:defRPr>
+            </a:lvl2pPr>
+            <a:lvl3pPr marL="508000" indent="-184150" algn="l" defTabSz="820738" rtl="0" eaLnBrk="1" fontAlgn="base" hangingPunct="1">
+              <a:lnSpc>
+                <a:spcPct val="90000"/>
+              </a:lnSpc>
+              <a:spcBef>
+                <a:spcPct val="30000"/>
+              </a:spcBef>
+              <a:spcAft>
+                <a:spcPct val="0"/>
+              </a:spcAft>
+              <a:buClr>
+                <a:schemeClr val="bg1"/>
+              </a:buClr>
+              <a:buFont typeface="Arial" panose="020B0604020202020204" pitchFamily="34" charset="0"/>
+              <a:buChar char="•"/>
+              <a:defRPr>
+                <a:solidFill>
+                  <a:schemeClr val="bg1"/>
+                </a:solidFill>
+                <a:latin typeface="+mn-lt"/>
+              </a:defRPr>
+            </a:lvl3pPr>
+            <a:lvl4pPr marL="803275" indent="-225425" algn="l" defTabSz="820738" rtl="0" eaLnBrk="1" fontAlgn="base" hangingPunct="1">
+              <a:lnSpc>
+                <a:spcPct val="90000"/>
+              </a:lnSpc>
+              <a:spcBef>
+                <a:spcPct val="30000"/>
+              </a:spcBef>
+              <a:spcAft>
+                <a:spcPct val="0"/>
+              </a:spcAft>
+              <a:buClr>
+                <a:schemeClr val="bg1"/>
+              </a:buClr>
+              <a:buFont typeface="Arial" panose="020B0604020202020204" pitchFamily="34" charset="0"/>
+              <a:buChar char="•"/>
+              <a:defRPr sz="1600">
+                <a:solidFill>
+                  <a:schemeClr val="bg1"/>
+                </a:solidFill>
+                <a:latin typeface="+mn-lt"/>
+              </a:defRPr>
+            </a:lvl4pPr>
+            <a:lvl5pPr marL="957263" indent="-163513" algn="l" defTabSz="820738" rtl="0" eaLnBrk="1" fontAlgn="base" hangingPunct="1">
+              <a:lnSpc>
+                <a:spcPct val="90000"/>
+              </a:lnSpc>
+              <a:spcBef>
+                <a:spcPct val="30000"/>
+              </a:spcBef>
+              <a:spcAft>
+                <a:spcPct val="0"/>
+              </a:spcAft>
+              <a:buClr>
+                <a:schemeClr val="tx2"/>
+              </a:buClr>
+              <a:buFont typeface="Arial" charset="0"/>
+              <a:buChar char="–"/>
+              <a:defRPr sz="1600">
+                <a:solidFill>
+                  <a:schemeClr val="tx1">
+                    <a:lumMod val="75000"/>
+                    <a:lumOff val="25000"/>
+                  </a:schemeClr>
+                </a:solidFill>
+                <a:latin typeface="+mn-lt"/>
+              </a:defRPr>
+            </a:lvl5pPr>
+            <a:lvl6pPr marL="1414463" indent="-163513" algn="l" defTabSz="820738" rtl="0" eaLnBrk="1" fontAlgn="base" hangingPunct="1">
+              <a:lnSpc>
+                <a:spcPct val="90000"/>
+              </a:lnSpc>
+              <a:spcBef>
+                <a:spcPct val="30000"/>
+              </a:spcBef>
+              <a:spcAft>
+                <a:spcPct val="0"/>
+              </a:spcAft>
+              <a:buClr>
+                <a:schemeClr val="tx2"/>
+              </a:buClr>
+              <a:buFont typeface="Arial" charset="0"/>
+              <a:buChar char="–"/>
+              <a:defRPr sz="1600">
+                <a:solidFill>
+                  <a:schemeClr val="tx1"/>
+                </a:solidFill>
+                <a:latin typeface="+mn-lt"/>
+              </a:defRPr>
+            </a:lvl6pPr>
+            <a:lvl7pPr marL="1871663" indent="-163513" algn="l" defTabSz="820738" rtl="0" eaLnBrk="1" fontAlgn="base" hangingPunct="1">
+              <a:lnSpc>
+                <a:spcPct val="90000"/>
+              </a:lnSpc>
+              <a:spcBef>
+                <a:spcPct val="30000"/>
+              </a:spcBef>
+              <a:spcAft>
+                <a:spcPct val="0"/>
+              </a:spcAft>
+              <a:buClr>
+                <a:schemeClr val="tx2"/>
+              </a:buClr>
+              <a:buFont typeface="Arial" charset="0"/>
+              <a:buChar char="–"/>
+              <a:defRPr sz="1600">
+                <a:solidFill>
+                  <a:schemeClr val="tx1"/>
+                </a:solidFill>
+                <a:latin typeface="+mn-lt"/>
+              </a:defRPr>
+            </a:lvl7pPr>
+            <a:lvl8pPr marL="2328863" indent="-163513" algn="l" defTabSz="820738" rtl="0" eaLnBrk="1" fontAlgn="base" hangingPunct="1">
+              <a:lnSpc>
+                <a:spcPct val="90000"/>
+              </a:lnSpc>
+              <a:spcBef>
+                <a:spcPct val="30000"/>
+              </a:spcBef>
+              <a:spcAft>
+                <a:spcPct val="0"/>
+              </a:spcAft>
+              <a:buClr>
+                <a:schemeClr val="tx2"/>
+              </a:buClr>
+              <a:buFont typeface="Arial" charset="0"/>
+              <a:buChar char="–"/>
+              <a:defRPr sz="1600">
+                <a:solidFill>
+                  <a:schemeClr val="tx1"/>
+                </a:solidFill>
+                <a:latin typeface="+mn-lt"/>
+              </a:defRPr>
+            </a:lvl8pPr>
+            <a:lvl9pPr marL="2786063" indent="-163513" algn="l" defTabSz="820738" rtl="0" eaLnBrk="1" fontAlgn="base" hangingPunct="1">
+              <a:lnSpc>
+                <a:spcPct val="90000"/>
+              </a:lnSpc>
+              <a:spcBef>
+                <a:spcPct val="30000"/>
+              </a:spcBef>
+              <a:spcAft>
+                <a:spcPct val="0"/>
+              </a:spcAft>
+              <a:buClr>
+                <a:schemeClr val="tx2"/>
+              </a:buClr>
+              <a:buFont typeface="Arial" charset="0"/>
+              <a:buChar char="–"/>
+              <a:defRPr sz="1600">
+                <a:solidFill>
+                  <a:schemeClr val="tx1"/>
+                </a:solidFill>
+                <a:latin typeface="+mn-lt"/>
+              </a:defRPr>
+            </a:lvl9pPr>
+          </a:lstStyle>
+          <a:p>
+            <a:pPr marL="171450" indent="-171450"/>
+            <a:r>
+              <a:rPr lang="en-US" sz="1200" kern="0" dirty="0" smtClean="0"/>
+              <a:t>Lack of Knowledge</a:t>
+            </a:r>
+          </a:p>
+          <a:p>
+            <a:pPr lvl="1"/>
+            <a:r>
+              <a:rPr lang="en-US" sz="1200" kern="0" dirty="0" smtClean="0"/>
+              <a:t>Attrition</a:t>
+            </a:r>
+          </a:p>
+          <a:p>
+            <a:pPr lvl="1"/>
+            <a:r>
+              <a:rPr lang="en-US" sz="1200" kern="0" dirty="0" smtClean="0"/>
+              <a:t>Disjointed/Incomplete Training</a:t>
+            </a:r>
+          </a:p>
+          <a:p>
+            <a:pPr marL="171450" indent="-171450"/>
+            <a:r>
+              <a:rPr lang="en-US" sz="1200" kern="0" dirty="0" smtClean="0"/>
+              <a:t>Lack of Adequate Tool-Chain</a:t>
+            </a:r>
+          </a:p>
+          <a:p>
+            <a:pPr lvl="1"/>
+            <a:r>
+              <a:rPr lang="en-US" sz="1200" kern="0" dirty="0" smtClean="0"/>
+              <a:t>Manually Integrated (process controlled)</a:t>
+            </a:r>
+          </a:p>
+          <a:p>
+            <a:pPr lvl="1"/>
+            <a:r>
+              <a:rPr lang="en-US" sz="1200" kern="0" dirty="0" smtClean="0"/>
+              <a:t>Outdated Tools</a:t>
+            </a:r>
+          </a:p>
+          <a:p>
+            <a:pPr lvl="1"/>
+            <a:r>
+              <a:rPr lang="en-US" sz="1200" kern="0" dirty="0" smtClean="0"/>
+              <a:t>Tools Extended Past Intended Usage</a:t>
+            </a:r>
+            <a:endParaRPr lang="en-US" sz="1200" kern="0" dirty="0"/>
+          </a:p>
+        </p:txBody>
+      </p:sp>
+      <p:sp>
+        <p:nvSpPr>
           <p:cNvPr id="2" name="Title 1"/>
           <p:cNvSpPr>
             <a:spLocks noGrp="1"/>
@@ -8257,7 +9821,11 @@
           <a:bodyPr/>
           <a:lstStyle/>
           <a:p>
-            <a:endParaRPr lang="en-GB"/>
+            <a:r>
+              <a:rPr lang="en-US" dirty="0" smtClean="0"/>
+              <a:t>Problem Statement</a:t>
+            </a:r>
+            <a:endParaRPr lang="en-US" dirty="0"/>
           </a:p>
         </p:txBody>
       </p:sp>
@@ -8276,7 +9844,23 @@
           <a:bodyPr/>
           <a:lstStyle/>
           <a:p>
-            <a:endParaRPr lang="en-GB"/>
+            <a:r>
+              <a:rPr lang="en-US" dirty="0" smtClean="0">
+                <a:solidFill>
+                  <a:schemeClr val="bg1">
+                    <a:lumMod val="50000"/>
+                  </a:schemeClr>
+                </a:solidFill>
+              </a:rPr>
+              <a:t>Agile for Model-Based-Standards Development</a:t>
+            </a:r>
+            <a:endParaRPr lang="en-US" dirty="0">
+              <a:solidFill>
+                <a:schemeClr val="bg1">
+                  <a:lumMod val="50000"/>
+                </a:schemeClr>
+              </a:solidFill>
+            </a:endParaRPr>
           </a:p>
         </p:txBody>
       </p:sp>
@@ -8290,19 +9874,706 @@
             <p:ph sz="quarter" idx="16"/>
           </p:nvPr>
         </p:nvSpPr>
-        <p:spPr/>
+        <p:spPr>
+          <a:xfrm>
+            <a:off x="405383" y="1283208"/>
+            <a:ext cx="5601407" cy="276999"/>
+          </a:xfrm>
+        </p:spPr>
         <p:txBody>
           <a:bodyPr/>
           <a:lstStyle/>
           <a:p>
-            <a:endParaRPr lang="en-GB"/>
+            <a:r>
+              <a:rPr lang="en-US" dirty="0" smtClean="0"/>
+              <a:t>Extended Development Time Length</a:t>
+            </a:r>
+            <a:endParaRPr lang="en-US" dirty="0"/>
           </a:p>
         </p:txBody>
       </p:sp>
+      <p:sp>
+        <p:nvSpPr>
+          <p:cNvPr id="5" name="Content Placeholder 3"/>
+          <p:cNvSpPr txBox="1">
+            <a:spLocks/>
+          </p:cNvSpPr>
+          <p:nvPr/>
+        </p:nvSpPr>
+        <p:spPr bwMode="auto">
+          <a:xfrm>
+            <a:off x="6204017" y="1283208"/>
+            <a:ext cx="5601407" cy="276999"/>
+          </a:xfrm>
+          <a:prstGeom prst="rect">
+            <a:avLst/>
+          </a:prstGeom>
+          <a:solidFill>
+            <a:schemeClr val="tx1">
+              <a:lumMod val="75000"/>
+              <a:lumOff val="25000"/>
+            </a:schemeClr>
+          </a:solidFill>
+          <a:ln w="9525">
+            <a:noFill/>
+            <a:miter lim="800000"/>
+            <a:headEnd/>
+            <a:tailEnd/>
+          </a:ln>
+          <a:effectLst/>
+        </p:spPr>
+        <p:txBody>
+          <a:bodyPr vert="horz" wrap="square" lIns="0" tIns="0" rIns="0" bIns="0" numCol="1" anchor="t" anchorCtr="0" compatLnSpc="1">
+            <a:prstTxWarp prst="textNoShape">
+              <a:avLst/>
+            </a:prstTxWarp>
+            <a:spAutoFit/>
+          </a:bodyPr>
+          <a:lstStyle>
+            <a:lvl1pPr marL="0" indent="0" algn="l" defTabSz="820738" rtl="0" eaLnBrk="1" fontAlgn="base" hangingPunct="1">
+              <a:lnSpc>
+                <a:spcPct val="90000"/>
+              </a:lnSpc>
+              <a:spcBef>
+                <a:spcPct val="30000"/>
+              </a:spcBef>
+              <a:spcAft>
+                <a:spcPct val="0"/>
+              </a:spcAft>
+              <a:buClr>
+                <a:schemeClr val="tx2"/>
+              </a:buClr>
+              <a:buFont typeface="Symbol" panose="05050102010706020507" pitchFamily="18" charset="2"/>
+              <a:buChar char=""/>
+              <a:defRPr sz="2000" b="1">
+                <a:solidFill>
+                  <a:schemeClr val="bg1"/>
+                </a:solidFill>
+                <a:latin typeface="+mn-lt"/>
+                <a:ea typeface="+mn-ea"/>
+                <a:cs typeface="+mn-cs"/>
+              </a:defRPr>
+            </a:lvl1pPr>
+            <a:lvl2pPr marL="288925" indent="-173038" algn="l" defTabSz="820738" rtl="0" eaLnBrk="1" fontAlgn="base" hangingPunct="1">
+              <a:lnSpc>
+                <a:spcPct val="90000"/>
+              </a:lnSpc>
+              <a:spcBef>
+                <a:spcPct val="30000"/>
+              </a:spcBef>
+              <a:spcAft>
+                <a:spcPct val="0"/>
+              </a:spcAft>
+              <a:buClr>
+                <a:schemeClr val="bg1"/>
+              </a:buClr>
+              <a:buFont typeface="Arial" panose="020B0604020202020204" pitchFamily="34" charset="0"/>
+              <a:buChar char="•"/>
+              <a:defRPr sz="2000">
+                <a:solidFill>
+                  <a:schemeClr val="bg1"/>
+                </a:solidFill>
+                <a:latin typeface="+mn-lt"/>
+              </a:defRPr>
+            </a:lvl2pPr>
+            <a:lvl3pPr marL="508000" indent="-184150" algn="l" defTabSz="820738" rtl="0" eaLnBrk="1" fontAlgn="base" hangingPunct="1">
+              <a:lnSpc>
+                <a:spcPct val="90000"/>
+              </a:lnSpc>
+              <a:spcBef>
+                <a:spcPct val="30000"/>
+              </a:spcBef>
+              <a:spcAft>
+                <a:spcPct val="0"/>
+              </a:spcAft>
+              <a:buClr>
+                <a:schemeClr val="bg1"/>
+              </a:buClr>
+              <a:buFont typeface="Arial" panose="020B0604020202020204" pitchFamily="34" charset="0"/>
+              <a:buChar char="•"/>
+              <a:defRPr>
+                <a:solidFill>
+                  <a:schemeClr val="bg1"/>
+                </a:solidFill>
+                <a:latin typeface="+mn-lt"/>
+              </a:defRPr>
+            </a:lvl3pPr>
+            <a:lvl4pPr marL="803275" indent="-225425" algn="l" defTabSz="820738" rtl="0" eaLnBrk="1" fontAlgn="base" hangingPunct="1">
+              <a:lnSpc>
+                <a:spcPct val="90000"/>
+              </a:lnSpc>
+              <a:spcBef>
+                <a:spcPct val="30000"/>
+              </a:spcBef>
+              <a:spcAft>
+                <a:spcPct val="0"/>
+              </a:spcAft>
+              <a:buClr>
+                <a:schemeClr val="bg1"/>
+              </a:buClr>
+              <a:buFont typeface="Arial" panose="020B0604020202020204" pitchFamily="34" charset="0"/>
+              <a:buChar char="•"/>
+              <a:defRPr sz="1600">
+                <a:solidFill>
+                  <a:schemeClr val="bg1"/>
+                </a:solidFill>
+                <a:latin typeface="+mn-lt"/>
+              </a:defRPr>
+            </a:lvl4pPr>
+            <a:lvl5pPr marL="957263" indent="-163513" algn="l" defTabSz="820738" rtl="0" eaLnBrk="1" fontAlgn="base" hangingPunct="1">
+              <a:lnSpc>
+                <a:spcPct val="90000"/>
+              </a:lnSpc>
+              <a:spcBef>
+                <a:spcPct val="30000"/>
+              </a:spcBef>
+              <a:spcAft>
+                <a:spcPct val="0"/>
+              </a:spcAft>
+              <a:buClr>
+                <a:schemeClr val="tx2"/>
+              </a:buClr>
+              <a:buFont typeface="Arial" charset="0"/>
+              <a:buChar char="–"/>
+              <a:defRPr sz="1600">
+                <a:solidFill>
+                  <a:schemeClr val="tx1">
+                    <a:lumMod val="75000"/>
+                    <a:lumOff val="25000"/>
+                  </a:schemeClr>
+                </a:solidFill>
+                <a:latin typeface="+mn-lt"/>
+              </a:defRPr>
+            </a:lvl5pPr>
+            <a:lvl6pPr marL="1414463" indent="-163513" algn="l" defTabSz="820738" rtl="0" eaLnBrk="1" fontAlgn="base" hangingPunct="1">
+              <a:lnSpc>
+                <a:spcPct val="90000"/>
+              </a:lnSpc>
+              <a:spcBef>
+                <a:spcPct val="30000"/>
+              </a:spcBef>
+              <a:spcAft>
+                <a:spcPct val="0"/>
+              </a:spcAft>
+              <a:buClr>
+                <a:schemeClr val="tx2"/>
+              </a:buClr>
+              <a:buFont typeface="Arial" charset="0"/>
+              <a:buChar char="–"/>
+              <a:defRPr sz="1600">
+                <a:solidFill>
+                  <a:schemeClr val="tx1"/>
+                </a:solidFill>
+                <a:latin typeface="+mn-lt"/>
+              </a:defRPr>
+            </a:lvl6pPr>
+            <a:lvl7pPr marL="1871663" indent="-163513" algn="l" defTabSz="820738" rtl="0" eaLnBrk="1" fontAlgn="base" hangingPunct="1">
+              <a:lnSpc>
+                <a:spcPct val="90000"/>
+              </a:lnSpc>
+              <a:spcBef>
+                <a:spcPct val="30000"/>
+              </a:spcBef>
+              <a:spcAft>
+                <a:spcPct val="0"/>
+              </a:spcAft>
+              <a:buClr>
+                <a:schemeClr val="tx2"/>
+              </a:buClr>
+              <a:buFont typeface="Arial" charset="0"/>
+              <a:buChar char="–"/>
+              <a:defRPr sz="1600">
+                <a:solidFill>
+                  <a:schemeClr val="tx1"/>
+                </a:solidFill>
+                <a:latin typeface="+mn-lt"/>
+              </a:defRPr>
+            </a:lvl7pPr>
+            <a:lvl8pPr marL="2328863" indent="-163513" algn="l" defTabSz="820738" rtl="0" eaLnBrk="1" fontAlgn="base" hangingPunct="1">
+              <a:lnSpc>
+                <a:spcPct val="90000"/>
+              </a:lnSpc>
+              <a:spcBef>
+                <a:spcPct val="30000"/>
+              </a:spcBef>
+              <a:spcAft>
+                <a:spcPct val="0"/>
+              </a:spcAft>
+              <a:buClr>
+                <a:schemeClr val="tx2"/>
+              </a:buClr>
+              <a:buFont typeface="Arial" charset="0"/>
+              <a:buChar char="–"/>
+              <a:defRPr sz="1600">
+                <a:solidFill>
+                  <a:schemeClr val="tx1"/>
+                </a:solidFill>
+                <a:latin typeface="+mn-lt"/>
+              </a:defRPr>
+            </a:lvl8pPr>
+            <a:lvl9pPr marL="2786063" indent="-163513" algn="l" defTabSz="820738" rtl="0" eaLnBrk="1" fontAlgn="base" hangingPunct="1">
+              <a:lnSpc>
+                <a:spcPct val="90000"/>
+              </a:lnSpc>
+              <a:spcBef>
+                <a:spcPct val="30000"/>
+              </a:spcBef>
+              <a:spcAft>
+                <a:spcPct val="0"/>
+              </a:spcAft>
+              <a:buClr>
+                <a:schemeClr val="tx2"/>
+              </a:buClr>
+              <a:buFont typeface="Arial" charset="0"/>
+              <a:buChar char="–"/>
+              <a:defRPr sz="1600">
+                <a:solidFill>
+                  <a:schemeClr val="tx1"/>
+                </a:solidFill>
+                <a:latin typeface="+mn-lt"/>
+              </a:defRPr>
+            </a:lvl9pPr>
+          </a:lstStyle>
+          <a:p>
+            <a:r>
+              <a:rPr lang="en-US" kern="0" dirty="0" smtClean="0"/>
+              <a:t>Defects in Quality/Completeness of Releases</a:t>
+            </a:r>
+            <a:endParaRPr lang="en-US" kern="0" dirty="0"/>
+          </a:p>
+        </p:txBody>
+      </p:sp>
+      <p:sp>
+        <p:nvSpPr>
+          <p:cNvPr id="6" name="Content Placeholder 3"/>
+          <p:cNvSpPr txBox="1">
+            <a:spLocks/>
+          </p:cNvSpPr>
+          <p:nvPr/>
+        </p:nvSpPr>
+        <p:spPr bwMode="auto">
+          <a:xfrm>
+            <a:off x="405383" y="4802532"/>
+            <a:ext cx="5601407" cy="1495794"/>
+          </a:xfrm>
+          <a:prstGeom prst="rect">
+            <a:avLst/>
+          </a:prstGeom>
+          <a:solidFill>
+            <a:schemeClr val="tx1">
+              <a:lumMod val="75000"/>
+              <a:lumOff val="25000"/>
+            </a:schemeClr>
+          </a:solidFill>
+          <a:ln w="9525">
+            <a:noFill/>
+            <a:miter lim="800000"/>
+            <a:headEnd/>
+            <a:tailEnd/>
+          </a:ln>
+          <a:effectLst/>
+        </p:spPr>
+        <p:txBody>
+          <a:bodyPr vert="horz" wrap="square" lIns="0" tIns="0" rIns="0" bIns="0" numCol="1" anchor="t" anchorCtr="0" compatLnSpc="1">
+            <a:prstTxWarp prst="textNoShape">
+              <a:avLst/>
+            </a:prstTxWarp>
+            <a:spAutoFit/>
+          </a:bodyPr>
+          <a:lstStyle>
+            <a:lvl1pPr marL="0" indent="0" algn="l" defTabSz="820738" rtl="0" eaLnBrk="1" fontAlgn="base" hangingPunct="1">
+              <a:lnSpc>
+                <a:spcPct val="90000"/>
+              </a:lnSpc>
+              <a:spcBef>
+                <a:spcPct val="30000"/>
+              </a:spcBef>
+              <a:spcAft>
+                <a:spcPct val="0"/>
+              </a:spcAft>
+              <a:buClr>
+                <a:schemeClr val="tx2"/>
+              </a:buClr>
+              <a:buFont typeface="Symbol" panose="05050102010706020507" pitchFamily="18" charset="2"/>
+              <a:buChar char=""/>
+              <a:defRPr sz="2000" b="1">
+                <a:solidFill>
+                  <a:schemeClr val="bg1"/>
+                </a:solidFill>
+                <a:latin typeface="+mn-lt"/>
+                <a:ea typeface="+mn-ea"/>
+                <a:cs typeface="+mn-cs"/>
+              </a:defRPr>
+            </a:lvl1pPr>
+            <a:lvl2pPr marL="288925" indent="-173038" algn="l" defTabSz="820738" rtl="0" eaLnBrk="1" fontAlgn="base" hangingPunct="1">
+              <a:lnSpc>
+                <a:spcPct val="90000"/>
+              </a:lnSpc>
+              <a:spcBef>
+                <a:spcPct val="30000"/>
+              </a:spcBef>
+              <a:spcAft>
+                <a:spcPct val="0"/>
+              </a:spcAft>
+              <a:buClr>
+                <a:schemeClr val="bg1"/>
+              </a:buClr>
+              <a:buFont typeface="Arial" panose="020B0604020202020204" pitchFamily="34" charset="0"/>
+              <a:buChar char="•"/>
+              <a:defRPr sz="2000">
+                <a:solidFill>
+                  <a:schemeClr val="bg1"/>
+                </a:solidFill>
+                <a:latin typeface="+mn-lt"/>
+              </a:defRPr>
+            </a:lvl2pPr>
+            <a:lvl3pPr marL="508000" indent="-184150" algn="l" defTabSz="820738" rtl="0" eaLnBrk="1" fontAlgn="base" hangingPunct="1">
+              <a:lnSpc>
+                <a:spcPct val="90000"/>
+              </a:lnSpc>
+              <a:spcBef>
+                <a:spcPct val="30000"/>
+              </a:spcBef>
+              <a:spcAft>
+                <a:spcPct val="0"/>
+              </a:spcAft>
+              <a:buClr>
+                <a:schemeClr val="bg1"/>
+              </a:buClr>
+              <a:buFont typeface="Arial" panose="020B0604020202020204" pitchFamily="34" charset="0"/>
+              <a:buChar char="•"/>
+              <a:defRPr>
+                <a:solidFill>
+                  <a:schemeClr val="bg1"/>
+                </a:solidFill>
+                <a:latin typeface="+mn-lt"/>
+              </a:defRPr>
+            </a:lvl3pPr>
+            <a:lvl4pPr marL="803275" indent="-225425" algn="l" defTabSz="820738" rtl="0" eaLnBrk="1" fontAlgn="base" hangingPunct="1">
+              <a:lnSpc>
+                <a:spcPct val="90000"/>
+              </a:lnSpc>
+              <a:spcBef>
+                <a:spcPct val="30000"/>
+              </a:spcBef>
+              <a:spcAft>
+                <a:spcPct val="0"/>
+              </a:spcAft>
+              <a:buClr>
+                <a:schemeClr val="bg1"/>
+              </a:buClr>
+              <a:buFont typeface="Arial" panose="020B0604020202020204" pitchFamily="34" charset="0"/>
+              <a:buChar char="•"/>
+              <a:defRPr sz="1600">
+                <a:solidFill>
+                  <a:schemeClr val="bg1"/>
+                </a:solidFill>
+                <a:latin typeface="+mn-lt"/>
+              </a:defRPr>
+            </a:lvl4pPr>
+            <a:lvl5pPr marL="957263" indent="-163513" algn="l" defTabSz="820738" rtl="0" eaLnBrk="1" fontAlgn="base" hangingPunct="1">
+              <a:lnSpc>
+                <a:spcPct val="90000"/>
+              </a:lnSpc>
+              <a:spcBef>
+                <a:spcPct val="30000"/>
+              </a:spcBef>
+              <a:spcAft>
+                <a:spcPct val="0"/>
+              </a:spcAft>
+              <a:buClr>
+                <a:schemeClr val="tx2"/>
+              </a:buClr>
+              <a:buFont typeface="Arial" charset="0"/>
+              <a:buChar char="–"/>
+              <a:defRPr sz="1600">
+                <a:solidFill>
+                  <a:schemeClr val="tx1">
+                    <a:lumMod val="75000"/>
+                    <a:lumOff val="25000"/>
+                  </a:schemeClr>
+                </a:solidFill>
+                <a:latin typeface="+mn-lt"/>
+              </a:defRPr>
+            </a:lvl5pPr>
+            <a:lvl6pPr marL="1414463" indent="-163513" algn="l" defTabSz="820738" rtl="0" eaLnBrk="1" fontAlgn="base" hangingPunct="1">
+              <a:lnSpc>
+                <a:spcPct val="90000"/>
+              </a:lnSpc>
+              <a:spcBef>
+                <a:spcPct val="30000"/>
+              </a:spcBef>
+              <a:spcAft>
+                <a:spcPct val="0"/>
+              </a:spcAft>
+              <a:buClr>
+                <a:schemeClr val="tx2"/>
+              </a:buClr>
+              <a:buFont typeface="Arial" charset="0"/>
+              <a:buChar char="–"/>
+              <a:defRPr sz="1600">
+                <a:solidFill>
+                  <a:schemeClr val="tx1"/>
+                </a:solidFill>
+                <a:latin typeface="+mn-lt"/>
+              </a:defRPr>
+            </a:lvl6pPr>
+            <a:lvl7pPr marL="1871663" indent="-163513" algn="l" defTabSz="820738" rtl="0" eaLnBrk="1" fontAlgn="base" hangingPunct="1">
+              <a:lnSpc>
+                <a:spcPct val="90000"/>
+              </a:lnSpc>
+              <a:spcBef>
+                <a:spcPct val="30000"/>
+              </a:spcBef>
+              <a:spcAft>
+                <a:spcPct val="0"/>
+              </a:spcAft>
+              <a:buClr>
+                <a:schemeClr val="tx2"/>
+              </a:buClr>
+              <a:buFont typeface="Arial" charset="0"/>
+              <a:buChar char="–"/>
+              <a:defRPr sz="1600">
+                <a:solidFill>
+                  <a:schemeClr val="tx1"/>
+                </a:solidFill>
+                <a:latin typeface="+mn-lt"/>
+              </a:defRPr>
+            </a:lvl7pPr>
+            <a:lvl8pPr marL="2328863" indent="-163513" algn="l" defTabSz="820738" rtl="0" eaLnBrk="1" fontAlgn="base" hangingPunct="1">
+              <a:lnSpc>
+                <a:spcPct val="90000"/>
+              </a:lnSpc>
+              <a:spcBef>
+                <a:spcPct val="30000"/>
+              </a:spcBef>
+              <a:spcAft>
+                <a:spcPct val="0"/>
+              </a:spcAft>
+              <a:buClr>
+                <a:schemeClr val="tx2"/>
+              </a:buClr>
+              <a:buFont typeface="Arial" charset="0"/>
+              <a:buChar char="–"/>
+              <a:defRPr sz="1600">
+                <a:solidFill>
+                  <a:schemeClr val="tx1"/>
+                </a:solidFill>
+                <a:latin typeface="+mn-lt"/>
+              </a:defRPr>
+            </a:lvl8pPr>
+            <a:lvl9pPr marL="2786063" indent="-163513" algn="l" defTabSz="820738" rtl="0" eaLnBrk="1" fontAlgn="base" hangingPunct="1">
+              <a:lnSpc>
+                <a:spcPct val="90000"/>
+              </a:lnSpc>
+              <a:spcBef>
+                <a:spcPct val="30000"/>
+              </a:spcBef>
+              <a:spcAft>
+                <a:spcPct val="0"/>
+              </a:spcAft>
+              <a:buClr>
+                <a:schemeClr val="tx2"/>
+              </a:buClr>
+              <a:buFont typeface="Arial" charset="0"/>
+              <a:buChar char="–"/>
+              <a:defRPr sz="1600">
+                <a:solidFill>
+                  <a:schemeClr val="tx1"/>
+                </a:solidFill>
+                <a:latin typeface="+mn-lt"/>
+              </a:defRPr>
+            </a:lvl9pPr>
+          </a:lstStyle>
+          <a:p>
+            <a:pPr marL="285750" indent="-285750"/>
+            <a:r>
+              <a:rPr lang="en-US" sz="1200" kern="0" dirty="0" smtClean="0"/>
+              <a:t>Failure to Gain Consensus</a:t>
+            </a:r>
+          </a:p>
+          <a:p>
+            <a:pPr marL="574675" lvl="1" indent="-285750"/>
+            <a:r>
+              <a:rPr lang="en-US" sz="1200" kern="0" dirty="0"/>
+              <a:t>Non Optimized </a:t>
+            </a:r>
+            <a:r>
+              <a:rPr lang="en-US" sz="1200" kern="0" dirty="0" smtClean="0"/>
+              <a:t>Tool-Chain</a:t>
+            </a:r>
+          </a:p>
+          <a:p>
+            <a:pPr marL="574675" lvl="1" indent="-285750"/>
+            <a:r>
+              <a:rPr lang="en-US" sz="1200" kern="0" dirty="0" smtClean="0"/>
+              <a:t>Lack of Workflow Constraints</a:t>
+            </a:r>
+          </a:p>
+          <a:p>
+            <a:pPr marL="285750" indent="-285750"/>
+            <a:r>
+              <a:rPr lang="en-US" sz="1200" kern="0" dirty="0" smtClean="0"/>
+              <a:t>Resource Commitment/Management</a:t>
+            </a:r>
+          </a:p>
+          <a:p>
+            <a:pPr marL="574675" lvl="1" indent="-285750"/>
+            <a:r>
+              <a:rPr lang="en-US" sz="1200" kern="0" dirty="0" smtClean="0"/>
+              <a:t>Volunteer Staff</a:t>
+            </a:r>
+          </a:p>
+          <a:p>
+            <a:pPr marL="574675" lvl="1" indent="-285750"/>
+            <a:r>
+              <a:rPr lang="en-US" sz="1200" kern="0" dirty="0" smtClean="0"/>
+              <a:t>Lack of Resources</a:t>
+            </a:r>
+          </a:p>
+          <a:p>
+            <a:pPr marL="574675" lvl="1" indent="-285750"/>
+            <a:r>
+              <a:rPr lang="en-US" sz="1200" kern="0" dirty="0" smtClean="0"/>
+              <a:t>Virtually Distributed Team</a:t>
+            </a:r>
+            <a:endParaRPr lang="en-US" sz="1200" kern="0" dirty="0"/>
+          </a:p>
+        </p:txBody>
+      </p:sp>
+      <p:pic>
+        <p:nvPicPr>
+          <p:cNvPr id="8" name="Picture 7"/>
+          <p:cNvPicPr/>
+          <p:nvPr/>
+        </p:nvPicPr>
+        <p:blipFill>
+          <a:blip r:embed="rId3" cstate="print">
+            <a:extLst>
+              <a:ext uri="{28A0092B-C50C-407E-A947-70E740481C1C}">
+                <a14:useLocalDpi xmlns:a14="http://schemas.microsoft.com/office/drawing/2010/main" val="0"/>
+              </a:ext>
+            </a:extLst>
+          </a:blip>
+          <a:srcRect/>
+          <a:stretch>
+            <a:fillRect/>
+          </a:stretch>
+        </p:blipFill>
+        <p:spPr bwMode="auto">
+          <a:xfrm>
+            <a:off x="442231" y="1579277"/>
+            <a:ext cx="5195878" cy="3139176"/>
+          </a:xfrm>
+          <a:prstGeom prst="rect">
+            <a:avLst/>
+          </a:prstGeom>
+          <a:ln w="9525" cap="sq">
+            <a:solidFill>
+              <a:srgbClr val="000000"/>
+            </a:solidFill>
+            <a:prstDash val="solid"/>
+            <a:miter lim="800000"/>
+          </a:ln>
+          <a:effectLst>
+            <a:outerShdw blurRad="50800" dist="38100" dir="2700000" algn="tl" rotWithShape="0">
+              <a:srgbClr val="000000">
+                <a:alpha val="43000"/>
+              </a:srgbClr>
+            </a:outerShdw>
+          </a:effectLst>
+        </p:spPr>
+      </p:pic>
+      <p:pic>
+        <p:nvPicPr>
+          <p:cNvPr id="9" name="Picture 8"/>
+          <p:cNvPicPr/>
+          <p:nvPr/>
+        </p:nvPicPr>
+        <p:blipFill>
+          <a:blip r:embed="rId4" cstate="print">
+            <a:extLst>
+              <a:ext uri="{28A0092B-C50C-407E-A947-70E740481C1C}">
+                <a14:useLocalDpi xmlns:a14="http://schemas.microsoft.com/office/drawing/2010/main" val="0"/>
+              </a:ext>
+            </a:extLst>
+          </a:blip>
+          <a:srcRect/>
+          <a:stretch>
+            <a:fillRect/>
+          </a:stretch>
+        </p:blipFill>
+        <p:spPr bwMode="auto">
+          <a:xfrm>
+            <a:off x="6239441" y="1586075"/>
+            <a:ext cx="4997906" cy="3124943"/>
+          </a:xfrm>
+          <a:prstGeom prst="rect">
+            <a:avLst/>
+          </a:prstGeom>
+          <a:ln w="9525" cap="sq">
+            <a:solidFill>
+              <a:srgbClr val="000000"/>
+            </a:solidFill>
+            <a:prstDash val="solid"/>
+            <a:miter lim="800000"/>
+          </a:ln>
+          <a:effectLst>
+            <a:outerShdw blurRad="50800" dist="38100" dir="2700000" algn="tl" rotWithShape="0">
+              <a:srgbClr val="000000">
+                <a:alpha val="43000"/>
+              </a:srgbClr>
+            </a:outerShdw>
+          </a:effectLst>
+        </p:spPr>
+      </p:pic>
+      <p:pic>
+        <p:nvPicPr>
+          <p:cNvPr id="10" name="Picture 9"/>
+          <p:cNvPicPr/>
+          <p:nvPr/>
+        </p:nvPicPr>
+        <p:blipFill>
+          <a:blip r:embed="rId5" cstate="print">
+            <a:extLst>
+              <a:ext uri="{28A0092B-C50C-407E-A947-70E740481C1C}">
+                <a14:useLocalDpi xmlns:a14="http://schemas.microsoft.com/office/drawing/2010/main" val="0"/>
+              </a:ext>
+            </a:extLst>
+          </a:blip>
+          <a:srcRect/>
+          <a:stretch>
+            <a:fillRect/>
+          </a:stretch>
+        </p:blipFill>
+        <p:spPr bwMode="auto">
+          <a:xfrm>
+            <a:off x="9526587" y="2641600"/>
+            <a:ext cx="2531110" cy="1871980"/>
+          </a:xfrm>
+          <a:prstGeom prst="rect">
+            <a:avLst/>
+          </a:prstGeom>
+          <a:ln w="9525" cap="sq">
+            <a:solidFill>
+              <a:srgbClr val="000000"/>
+            </a:solidFill>
+            <a:prstDash val="solid"/>
+            <a:miter lim="800000"/>
+          </a:ln>
+          <a:effectLst>
+            <a:outerShdw blurRad="50800" dist="38100" dir="2700000" algn="tl" rotWithShape="0">
+              <a:srgbClr val="000000">
+                <a:alpha val="43000"/>
+              </a:srgbClr>
+            </a:outerShdw>
+          </a:effectLst>
+        </p:spPr>
+      </p:pic>
     </p:spTree>
     <p:extLst>
       <p:ext uri="{BB962C8B-B14F-4D97-AF65-F5344CB8AC3E}">
-        <p14:creationId xmlns:p14="http://schemas.microsoft.com/office/powerpoint/2010/main" val="4034539652"/>
+        <p14:creationId xmlns:p14="http://schemas.microsoft.com/office/powerpoint/2010/main" val="2417374964"/>
       </p:ext>
     </p:extLst>
   </p:cSld>
@@ -8356,7 +10627,11 @@
           <a:bodyPr/>
           <a:lstStyle/>
           <a:p>
-            <a:endParaRPr lang="en-GB"/>
+            <a:r>
+              <a:rPr lang="en-GB" dirty="0" smtClean="0"/>
+              <a:t>Proposed Solution</a:t>
+            </a:r>
+            <a:endParaRPr lang="en-GB" dirty="0"/>
           </a:p>
         </p:txBody>
       </p:sp>
@@ -8370,12 +10645,43 @@
             <p:ph type="body" sz="quarter" idx="12"/>
           </p:nvPr>
         </p:nvSpPr>
-        <p:spPr/>
+        <p:spPr>
+          <a:xfrm>
+            <a:off x="448055" y="777240"/>
+            <a:ext cx="11311128" cy="323165"/>
+          </a:xfrm>
+        </p:spPr>
         <p:txBody>
           <a:bodyPr/>
           <a:lstStyle/>
           <a:p>
-            <a:endParaRPr lang="en-GB"/>
+            <a:r>
+              <a:rPr lang="en-US" dirty="0">
+                <a:solidFill>
+                  <a:schemeClr val="bg1">
+                    <a:lumMod val="50000"/>
+                  </a:schemeClr>
+                </a:solidFill>
+              </a:rPr>
+              <a:t>Agile for Model-Based-Standards </a:t>
+            </a:r>
+            <a:r>
+              <a:rPr lang="en-US" dirty="0" smtClean="0">
+                <a:solidFill>
+                  <a:schemeClr val="bg1">
+                    <a:lumMod val="50000"/>
+                  </a:schemeClr>
+                </a:solidFill>
+              </a:rPr>
+              <a:t>Development</a:t>
+            </a:r>
+            <a:endParaRPr lang="en-US" dirty="0">
+              <a:solidFill>
+                <a:schemeClr val="bg1">
+                  <a:lumMod val="50000"/>
+                </a:schemeClr>
+              </a:solidFill>
+            </a:endParaRPr>
           </a:p>
         </p:txBody>
       </p:sp>
@@ -8389,7 +10695,12 @@
             <p:ph sz="quarter" idx="16"/>
           </p:nvPr>
         </p:nvSpPr>
-        <p:spPr/>
+        <p:spPr>
+          <a:xfrm>
+            <a:off x="405383" y="1283208"/>
+            <a:ext cx="11311128" cy="4839800"/>
+          </a:xfrm>
+        </p:spPr>
         <p:txBody>
           <a:bodyPr/>
           <a:lstStyle/>
@@ -8398,10 +10709,176 @@
           </a:p>
         </p:txBody>
       </p:sp>
+      <p:pic>
+        <p:nvPicPr>
+          <p:cNvPr id="5" name="Picture 4"/>
+          <p:cNvPicPr/>
+          <p:nvPr/>
+        </p:nvPicPr>
+        <p:blipFill>
+          <a:blip r:embed="rId3" cstate="print">
+            <a:extLst>
+              <a:ext uri="{28A0092B-C50C-407E-A947-70E740481C1C}">
+                <a14:useLocalDpi xmlns:a14="http://schemas.microsoft.com/office/drawing/2010/main" val="0"/>
+              </a:ext>
+            </a:extLst>
+          </a:blip>
+          <a:srcRect/>
+          <a:stretch>
+            <a:fillRect/>
+          </a:stretch>
+        </p:blipFill>
+        <p:spPr bwMode="auto">
+          <a:xfrm>
+            <a:off x="9262911" y="3487362"/>
+            <a:ext cx="2768118" cy="1176132"/>
+          </a:xfrm>
+          <a:prstGeom prst="rect">
+            <a:avLst/>
+          </a:prstGeom>
+          <a:solidFill>
+            <a:schemeClr val="bg1"/>
+          </a:solidFill>
+        </p:spPr>
+      </p:pic>
+      <p:pic>
+        <p:nvPicPr>
+          <p:cNvPr id="6" name="Picture 5"/>
+          <p:cNvPicPr/>
+          <p:nvPr/>
+        </p:nvPicPr>
+        <p:blipFill>
+          <a:blip r:embed="rId4">
+            <a:extLst>
+              <a:ext uri="{28A0092B-C50C-407E-A947-70E740481C1C}">
+                <a14:useLocalDpi xmlns:a14="http://schemas.microsoft.com/office/drawing/2010/main" val="0"/>
+              </a:ext>
+            </a:extLst>
+          </a:blip>
+          <a:stretch>
+            <a:fillRect/>
+          </a:stretch>
+        </p:blipFill>
+        <p:spPr>
+          <a:xfrm>
+            <a:off x="9252521" y="2737144"/>
+            <a:ext cx="2765782" cy="664596"/>
+          </a:xfrm>
+          <a:prstGeom prst="rect">
+            <a:avLst/>
+          </a:prstGeom>
+        </p:spPr>
+      </p:pic>
+      <p:sp>
+        <p:nvSpPr>
+          <p:cNvPr id="7" name="Rectangle 2"/>
+          <p:cNvSpPr>
+            <a:spLocks noChangeArrowheads="1"/>
+          </p:cNvSpPr>
+          <p:nvPr/>
+        </p:nvSpPr>
+        <p:spPr bwMode="auto">
+          <a:xfrm>
+            <a:off x="13487400" y="2087880"/>
+            <a:ext cx="12188825" cy="0"/>
+          </a:xfrm>
+          <a:prstGeom prst="rect">
+            <a:avLst/>
+          </a:prstGeom>
+          <a:solidFill>
+            <a:schemeClr val="bg1"/>
+          </a:solidFill>
+          <a:ln>
+            <a:noFill/>
+          </a:ln>
+          <a:effectLst/>
+        </p:spPr>
+        <p:txBody>
+          <a:bodyPr vert="horz" wrap="none" lIns="91440" tIns="45720" rIns="91440" bIns="45720" numCol="1" anchor="ctr" anchorCtr="0" compatLnSpc="1">
+            <a:prstTxWarp prst="textNoShape">
+              <a:avLst/>
+            </a:prstTxWarp>
+            <a:spAutoFit/>
+          </a:bodyPr>
+          <a:lstStyle/>
+          <a:p>
+            <a:endParaRPr lang="en-US"/>
+          </a:p>
+        </p:txBody>
+      </p:sp>
+      <p:graphicFrame>
+        <p:nvGraphicFramePr>
+          <p:cNvPr id="8" name="Object 7"/>
+          <p:cNvGraphicFramePr>
+            <a:graphicFrameLocks noChangeAspect="1"/>
+          </p:cNvGraphicFramePr>
+          <p:nvPr>
+            <p:extLst>
+              <p:ext uri="{D42A27DB-BD31-4B8C-83A1-F6EECF244321}">
+                <p14:modId xmlns:p14="http://schemas.microsoft.com/office/powerpoint/2010/main" val="3616864786"/>
+              </p:ext>
+            </p:extLst>
+          </p:nvPr>
+        </p:nvGraphicFramePr>
+        <p:xfrm>
+          <a:off x="9269007" y="4723049"/>
+          <a:ext cx="2743200" cy="1905000"/>
+        </p:xfrm>
+        <a:graphic>
+          <a:graphicData uri="http://schemas.openxmlformats.org/presentationml/2006/ole">
+            <mc:AlternateContent xmlns:mc="http://schemas.openxmlformats.org/markup-compatibility/2006">
+              <mc:Choice xmlns:v="urn:schemas-microsoft-com:vml" Requires="v">
+                <p:oleObj spid="_x0000_s1027" name="Visio" r:id="rId5" imgW="5467350" imgH="3819396" progId="Visio.Drawing.15">
+                  <p:embed/>
+                </p:oleObj>
+              </mc:Choice>
+              <mc:Fallback>
+                <p:oleObj name="Visio" r:id="rId5" imgW="5467350" imgH="3819396" progId="Visio.Drawing.15">
+                  <p:embed/>
+                  <p:pic>
+                    <p:nvPicPr>
+                      <p:cNvPr id="0" name="Object 1"/>
+                      <p:cNvPicPr>
+                        <a:picLocks noChangeAspect="1" noChangeArrowheads="1"/>
+                      </p:cNvPicPr>
+                      <p:nvPr/>
+                    </p:nvPicPr>
+                    <p:blipFill>
+                      <a:blip r:embed="rId6">
+                        <a:extLst>
+                          <a:ext uri="{28A0092B-C50C-407E-A947-70E740481C1C}">
+                            <a14:useLocalDpi xmlns:a14="http://schemas.microsoft.com/office/drawing/2010/main" val="0"/>
+                          </a:ext>
+                        </a:extLst>
+                      </a:blip>
+                      <a:srcRect/>
+                      <a:stretch>
+                        <a:fillRect/>
+                      </a:stretch>
+                    </p:blipFill>
+                    <p:spPr bwMode="auto">
+                      <a:xfrm>
+                        <a:off x="9269007" y="4723049"/>
+                        <a:ext cx="2743200" cy="1905000"/>
+                      </a:xfrm>
+                      <a:prstGeom prst="rect">
+                        <a:avLst/>
+                      </a:prstGeom>
+                      <a:solidFill>
+                        <a:schemeClr val="bg1"/>
+                      </a:solidFill>
+                    </p:spPr>
+                  </p:pic>
+                </p:oleObj>
+              </mc:Fallback>
+            </mc:AlternateContent>
+          </a:graphicData>
+        </a:graphic>
+      </p:graphicFrame>
     </p:spTree>
     <p:extLst>
       <p:ext uri="{BB962C8B-B14F-4D97-AF65-F5344CB8AC3E}">
-        <p14:creationId xmlns:p14="http://schemas.microsoft.com/office/powerpoint/2010/main" val="1776094296"/>
+        <p14:creationId xmlns:p14="http://schemas.microsoft.com/office/powerpoint/2010/main" val="4034539652"/>
       </p:ext>
     </p:extLst>
   </p:cSld>
@@ -8455,7 +10932,11 @@
           <a:bodyPr/>
           <a:lstStyle/>
           <a:p>
-            <a:endParaRPr lang="en-GB"/>
+            <a:r>
+              <a:rPr lang="en-GB" dirty="0" smtClean="0"/>
+              <a:t>Benefits &amp; Impacts</a:t>
+            </a:r>
+            <a:endParaRPr lang="en-GB" dirty="0"/>
           </a:p>
         </p:txBody>
       </p:sp>
@@ -8469,18 +10950,303 @@
             <p:ph type="body" sz="quarter" idx="12"/>
           </p:nvPr>
         </p:nvSpPr>
-        <p:spPr/>
+        <p:spPr>
+          <a:xfrm>
+            <a:off x="448055" y="777240"/>
+            <a:ext cx="11311128" cy="323165"/>
+          </a:xfrm>
+        </p:spPr>
         <p:txBody>
           <a:bodyPr/>
           <a:lstStyle/>
           <a:p>
-            <a:endParaRPr lang="en-GB"/>
+            <a:r>
+              <a:rPr lang="en-US" dirty="0">
+                <a:solidFill>
+                  <a:schemeClr val="bg1">
+                    <a:lumMod val="50000"/>
+                  </a:schemeClr>
+                </a:solidFill>
+              </a:rPr>
+              <a:t>Agile for Model-Based-Standards </a:t>
+            </a:r>
+            <a:r>
+              <a:rPr lang="en-US" dirty="0" smtClean="0">
+                <a:solidFill>
+                  <a:schemeClr val="bg1">
+                    <a:lumMod val="50000"/>
+                  </a:schemeClr>
+                </a:solidFill>
+              </a:rPr>
+              <a:t>Development</a:t>
+            </a:r>
+            <a:endParaRPr lang="en-US" dirty="0">
+              <a:solidFill>
+                <a:schemeClr val="bg1">
+                  <a:lumMod val="50000"/>
+                </a:schemeClr>
+              </a:solidFill>
+            </a:endParaRPr>
           </a:p>
         </p:txBody>
       </p:sp>
       <p:sp>
         <p:nvSpPr>
-          <p:cNvPr id="4" name="Content Placeholder 3"/>
+          <p:cNvPr id="5" name="Content Placeholder 3"/>
+          <p:cNvSpPr txBox="1">
+            <a:spLocks/>
+          </p:cNvSpPr>
+          <p:nvPr/>
+        </p:nvSpPr>
+        <p:spPr bwMode="auto">
+          <a:xfrm>
+            <a:off x="6285042" y="1705002"/>
+            <a:ext cx="5601407" cy="960263"/>
+          </a:xfrm>
+          <a:prstGeom prst="rect">
+            <a:avLst/>
+          </a:prstGeom>
+          <a:noFill/>
+          <a:ln w="9525">
+            <a:noFill/>
+            <a:miter lim="800000"/>
+            <a:headEnd/>
+            <a:tailEnd/>
+          </a:ln>
+          <a:effectLst/>
+        </p:spPr>
+        <p:txBody>
+          <a:bodyPr vert="horz" wrap="square" lIns="0" tIns="0" rIns="0" bIns="0" numCol="1" anchor="t" anchorCtr="0" compatLnSpc="1">
+            <a:prstTxWarp prst="textNoShape">
+              <a:avLst/>
+            </a:prstTxWarp>
+            <a:spAutoFit/>
+          </a:bodyPr>
+          <a:lstStyle>
+            <a:lvl1pPr marL="0" indent="0" algn="l" defTabSz="820738" rtl="0" eaLnBrk="1" fontAlgn="base" hangingPunct="1">
+              <a:lnSpc>
+                <a:spcPct val="90000"/>
+              </a:lnSpc>
+              <a:spcBef>
+                <a:spcPct val="30000"/>
+              </a:spcBef>
+              <a:spcAft>
+                <a:spcPct val="0"/>
+              </a:spcAft>
+              <a:buClr>
+                <a:schemeClr val="tx2"/>
+              </a:buClr>
+              <a:buFont typeface="Symbol" panose="05050102010706020507" pitchFamily="18" charset="2"/>
+              <a:buChar char=""/>
+              <a:defRPr sz="2000" b="1">
+                <a:solidFill>
+                  <a:schemeClr val="bg1"/>
+                </a:solidFill>
+                <a:latin typeface="+mn-lt"/>
+                <a:ea typeface="+mn-ea"/>
+                <a:cs typeface="+mn-cs"/>
+              </a:defRPr>
+            </a:lvl1pPr>
+            <a:lvl2pPr marL="288925" indent="-173038" algn="l" defTabSz="820738" rtl="0" eaLnBrk="1" fontAlgn="base" hangingPunct="1">
+              <a:lnSpc>
+                <a:spcPct val="90000"/>
+              </a:lnSpc>
+              <a:spcBef>
+                <a:spcPct val="30000"/>
+              </a:spcBef>
+              <a:spcAft>
+                <a:spcPct val="0"/>
+              </a:spcAft>
+              <a:buClr>
+                <a:schemeClr val="bg1"/>
+              </a:buClr>
+              <a:buFont typeface="Arial" panose="020B0604020202020204" pitchFamily="34" charset="0"/>
+              <a:buChar char="•"/>
+              <a:defRPr sz="2000">
+                <a:solidFill>
+                  <a:schemeClr val="bg1"/>
+                </a:solidFill>
+                <a:latin typeface="+mn-lt"/>
+              </a:defRPr>
+            </a:lvl2pPr>
+            <a:lvl3pPr marL="508000" indent="-184150" algn="l" defTabSz="820738" rtl="0" eaLnBrk="1" fontAlgn="base" hangingPunct="1">
+              <a:lnSpc>
+                <a:spcPct val="90000"/>
+              </a:lnSpc>
+              <a:spcBef>
+                <a:spcPct val="30000"/>
+              </a:spcBef>
+              <a:spcAft>
+                <a:spcPct val="0"/>
+              </a:spcAft>
+              <a:buClr>
+                <a:schemeClr val="bg1"/>
+              </a:buClr>
+              <a:buFont typeface="Arial" panose="020B0604020202020204" pitchFamily="34" charset="0"/>
+              <a:buChar char="•"/>
+              <a:defRPr>
+                <a:solidFill>
+                  <a:schemeClr val="bg1"/>
+                </a:solidFill>
+                <a:latin typeface="+mn-lt"/>
+              </a:defRPr>
+            </a:lvl3pPr>
+            <a:lvl4pPr marL="803275" indent="-225425" algn="l" defTabSz="820738" rtl="0" eaLnBrk="1" fontAlgn="base" hangingPunct="1">
+              <a:lnSpc>
+                <a:spcPct val="90000"/>
+              </a:lnSpc>
+              <a:spcBef>
+                <a:spcPct val="30000"/>
+              </a:spcBef>
+              <a:spcAft>
+                <a:spcPct val="0"/>
+              </a:spcAft>
+              <a:buClr>
+                <a:schemeClr val="bg1"/>
+              </a:buClr>
+              <a:buFont typeface="Arial" panose="020B0604020202020204" pitchFamily="34" charset="0"/>
+              <a:buChar char="•"/>
+              <a:defRPr sz="1600">
+                <a:solidFill>
+                  <a:schemeClr val="bg1"/>
+                </a:solidFill>
+                <a:latin typeface="+mn-lt"/>
+              </a:defRPr>
+            </a:lvl4pPr>
+            <a:lvl5pPr marL="957263" indent="-163513" algn="l" defTabSz="820738" rtl="0" eaLnBrk="1" fontAlgn="base" hangingPunct="1">
+              <a:lnSpc>
+                <a:spcPct val="90000"/>
+              </a:lnSpc>
+              <a:spcBef>
+                <a:spcPct val="30000"/>
+              </a:spcBef>
+              <a:spcAft>
+                <a:spcPct val="0"/>
+              </a:spcAft>
+              <a:buClr>
+                <a:schemeClr val="tx2"/>
+              </a:buClr>
+              <a:buFont typeface="Arial" charset="0"/>
+              <a:buChar char="–"/>
+              <a:defRPr sz="1600">
+                <a:solidFill>
+                  <a:schemeClr val="tx1">
+                    <a:lumMod val="75000"/>
+                    <a:lumOff val="25000"/>
+                  </a:schemeClr>
+                </a:solidFill>
+                <a:latin typeface="+mn-lt"/>
+              </a:defRPr>
+            </a:lvl5pPr>
+            <a:lvl6pPr marL="1414463" indent="-163513" algn="l" defTabSz="820738" rtl="0" eaLnBrk="1" fontAlgn="base" hangingPunct="1">
+              <a:lnSpc>
+                <a:spcPct val="90000"/>
+              </a:lnSpc>
+              <a:spcBef>
+                <a:spcPct val="30000"/>
+              </a:spcBef>
+              <a:spcAft>
+                <a:spcPct val="0"/>
+              </a:spcAft>
+              <a:buClr>
+                <a:schemeClr val="tx2"/>
+              </a:buClr>
+              <a:buFont typeface="Arial" charset="0"/>
+              <a:buChar char="–"/>
+              <a:defRPr sz="1600">
+                <a:solidFill>
+                  <a:schemeClr val="tx1"/>
+                </a:solidFill>
+                <a:latin typeface="+mn-lt"/>
+              </a:defRPr>
+            </a:lvl6pPr>
+            <a:lvl7pPr marL="1871663" indent="-163513" algn="l" defTabSz="820738" rtl="0" eaLnBrk="1" fontAlgn="base" hangingPunct="1">
+              <a:lnSpc>
+                <a:spcPct val="90000"/>
+              </a:lnSpc>
+              <a:spcBef>
+                <a:spcPct val="30000"/>
+              </a:spcBef>
+              <a:spcAft>
+                <a:spcPct val="0"/>
+              </a:spcAft>
+              <a:buClr>
+                <a:schemeClr val="tx2"/>
+              </a:buClr>
+              <a:buFont typeface="Arial" charset="0"/>
+              <a:buChar char="–"/>
+              <a:defRPr sz="1600">
+                <a:solidFill>
+                  <a:schemeClr val="tx1"/>
+                </a:solidFill>
+                <a:latin typeface="+mn-lt"/>
+              </a:defRPr>
+            </a:lvl7pPr>
+            <a:lvl8pPr marL="2328863" indent="-163513" algn="l" defTabSz="820738" rtl="0" eaLnBrk="1" fontAlgn="base" hangingPunct="1">
+              <a:lnSpc>
+                <a:spcPct val="90000"/>
+              </a:lnSpc>
+              <a:spcBef>
+                <a:spcPct val="30000"/>
+              </a:spcBef>
+              <a:spcAft>
+                <a:spcPct val="0"/>
+              </a:spcAft>
+              <a:buClr>
+                <a:schemeClr val="tx2"/>
+              </a:buClr>
+              <a:buFont typeface="Arial" charset="0"/>
+              <a:buChar char="–"/>
+              <a:defRPr sz="1600">
+                <a:solidFill>
+                  <a:schemeClr val="tx1"/>
+                </a:solidFill>
+                <a:latin typeface="+mn-lt"/>
+              </a:defRPr>
+            </a:lvl8pPr>
+            <a:lvl9pPr marL="2786063" indent="-163513" algn="l" defTabSz="820738" rtl="0" eaLnBrk="1" fontAlgn="base" hangingPunct="1">
+              <a:lnSpc>
+                <a:spcPct val="90000"/>
+              </a:lnSpc>
+              <a:spcBef>
+                <a:spcPct val="30000"/>
+              </a:spcBef>
+              <a:spcAft>
+                <a:spcPct val="0"/>
+              </a:spcAft>
+              <a:buClr>
+                <a:schemeClr val="tx2"/>
+              </a:buClr>
+              <a:buFont typeface="Arial" charset="0"/>
+              <a:buChar char="–"/>
+              <a:defRPr sz="1600">
+                <a:solidFill>
+                  <a:schemeClr val="tx1"/>
+                </a:solidFill>
+                <a:latin typeface="+mn-lt"/>
+              </a:defRPr>
+            </a:lvl9pPr>
+          </a:lstStyle>
+          <a:p>
+            <a:pPr marL="171450" indent="-171450"/>
+            <a:r>
+              <a:rPr lang="en-US" sz="1600" kern="0" dirty="0" smtClean="0"/>
+              <a:t>Increase speed of standards supporting info requirements gap closure</a:t>
+            </a:r>
+          </a:p>
+          <a:p>
+            <a:pPr marL="171450" indent="-171450"/>
+            <a:r>
+              <a:rPr lang="en-US" sz="1600" kern="0" dirty="0" smtClean="0"/>
+              <a:t>Reduction in interoperability costs (supplier assertion reduction, manual reentry, conversion)</a:t>
+            </a:r>
+            <a:endParaRPr lang="en-US" sz="1600" kern="0" dirty="0"/>
+          </a:p>
+        </p:txBody>
+      </p:sp>
+      <p:sp>
+        <p:nvSpPr>
+          <p:cNvPr id="6" name="Content Placeholder 3"/>
           <p:cNvSpPr>
             <a:spLocks noGrp="1"/>
           </p:cNvSpPr>
@@ -8488,19 +11254,552 @@
             <p:ph sz="quarter" idx="16"/>
           </p:nvPr>
         </p:nvSpPr>
-        <p:spPr/>
+        <p:spPr>
+          <a:xfrm>
+            <a:off x="405383" y="1283208"/>
+            <a:ext cx="5601407" cy="276999"/>
+          </a:xfrm>
+        </p:spPr>
         <p:txBody>
           <a:bodyPr/>
           <a:lstStyle/>
           <a:p>
-            <a:endParaRPr lang="en-GB"/>
+            <a:r>
+              <a:rPr lang="en-US" dirty="0" smtClean="0"/>
+              <a:t>Benefits to MBS Developer</a:t>
+            </a:r>
+            <a:endParaRPr lang="en-US" dirty="0"/>
+          </a:p>
+        </p:txBody>
+      </p:sp>
+      <p:sp>
+        <p:nvSpPr>
+          <p:cNvPr id="7" name="Content Placeholder 3"/>
+          <p:cNvSpPr txBox="1">
+            <a:spLocks/>
+          </p:cNvSpPr>
+          <p:nvPr/>
+        </p:nvSpPr>
+        <p:spPr bwMode="auto">
+          <a:xfrm>
+            <a:off x="6204017" y="1283208"/>
+            <a:ext cx="5601407" cy="276999"/>
+          </a:xfrm>
+          <a:prstGeom prst="rect">
+            <a:avLst/>
+          </a:prstGeom>
+          <a:solidFill>
+            <a:schemeClr val="tx1">
+              <a:lumMod val="75000"/>
+              <a:lumOff val="25000"/>
+            </a:schemeClr>
+          </a:solidFill>
+          <a:ln w="9525">
+            <a:noFill/>
+            <a:miter lim="800000"/>
+            <a:headEnd/>
+            <a:tailEnd/>
+          </a:ln>
+          <a:effectLst/>
+        </p:spPr>
+        <p:txBody>
+          <a:bodyPr vert="horz" wrap="square" lIns="0" tIns="0" rIns="0" bIns="0" numCol="1" anchor="t" anchorCtr="0" compatLnSpc="1">
+            <a:prstTxWarp prst="textNoShape">
+              <a:avLst/>
+            </a:prstTxWarp>
+            <a:spAutoFit/>
+          </a:bodyPr>
+          <a:lstStyle>
+            <a:lvl1pPr marL="0" indent="0" algn="l" defTabSz="820738" rtl="0" eaLnBrk="1" fontAlgn="base" hangingPunct="1">
+              <a:lnSpc>
+                <a:spcPct val="90000"/>
+              </a:lnSpc>
+              <a:spcBef>
+                <a:spcPct val="30000"/>
+              </a:spcBef>
+              <a:spcAft>
+                <a:spcPct val="0"/>
+              </a:spcAft>
+              <a:buClr>
+                <a:schemeClr val="tx2"/>
+              </a:buClr>
+              <a:buFont typeface="Symbol" panose="05050102010706020507" pitchFamily="18" charset="2"/>
+              <a:buChar char=""/>
+              <a:defRPr sz="2000" b="1">
+                <a:solidFill>
+                  <a:schemeClr val="bg1"/>
+                </a:solidFill>
+                <a:latin typeface="+mn-lt"/>
+                <a:ea typeface="+mn-ea"/>
+                <a:cs typeface="+mn-cs"/>
+              </a:defRPr>
+            </a:lvl1pPr>
+            <a:lvl2pPr marL="288925" indent="-173038" algn="l" defTabSz="820738" rtl="0" eaLnBrk="1" fontAlgn="base" hangingPunct="1">
+              <a:lnSpc>
+                <a:spcPct val="90000"/>
+              </a:lnSpc>
+              <a:spcBef>
+                <a:spcPct val="30000"/>
+              </a:spcBef>
+              <a:spcAft>
+                <a:spcPct val="0"/>
+              </a:spcAft>
+              <a:buClr>
+                <a:schemeClr val="bg1"/>
+              </a:buClr>
+              <a:buFont typeface="Arial" panose="020B0604020202020204" pitchFamily="34" charset="0"/>
+              <a:buChar char="•"/>
+              <a:defRPr sz="2000">
+                <a:solidFill>
+                  <a:schemeClr val="bg1"/>
+                </a:solidFill>
+                <a:latin typeface="+mn-lt"/>
+              </a:defRPr>
+            </a:lvl2pPr>
+            <a:lvl3pPr marL="508000" indent="-184150" algn="l" defTabSz="820738" rtl="0" eaLnBrk="1" fontAlgn="base" hangingPunct="1">
+              <a:lnSpc>
+                <a:spcPct val="90000"/>
+              </a:lnSpc>
+              <a:spcBef>
+                <a:spcPct val="30000"/>
+              </a:spcBef>
+              <a:spcAft>
+                <a:spcPct val="0"/>
+              </a:spcAft>
+              <a:buClr>
+                <a:schemeClr val="bg1"/>
+              </a:buClr>
+              <a:buFont typeface="Arial" panose="020B0604020202020204" pitchFamily="34" charset="0"/>
+              <a:buChar char="•"/>
+              <a:defRPr>
+                <a:solidFill>
+                  <a:schemeClr val="bg1"/>
+                </a:solidFill>
+                <a:latin typeface="+mn-lt"/>
+              </a:defRPr>
+            </a:lvl3pPr>
+            <a:lvl4pPr marL="803275" indent="-225425" algn="l" defTabSz="820738" rtl="0" eaLnBrk="1" fontAlgn="base" hangingPunct="1">
+              <a:lnSpc>
+                <a:spcPct val="90000"/>
+              </a:lnSpc>
+              <a:spcBef>
+                <a:spcPct val="30000"/>
+              </a:spcBef>
+              <a:spcAft>
+                <a:spcPct val="0"/>
+              </a:spcAft>
+              <a:buClr>
+                <a:schemeClr val="bg1"/>
+              </a:buClr>
+              <a:buFont typeface="Arial" panose="020B0604020202020204" pitchFamily="34" charset="0"/>
+              <a:buChar char="•"/>
+              <a:defRPr sz="1600">
+                <a:solidFill>
+                  <a:schemeClr val="bg1"/>
+                </a:solidFill>
+                <a:latin typeface="+mn-lt"/>
+              </a:defRPr>
+            </a:lvl4pPr>
+            <a:lvl5pPr marL="957263" indent="-163513" algn="l" defTabSz="820738" rtl="0" eaLnBrk="1" fontAlgn="base" hangingPunct="1">
+              <a:lnSpc>
+                <a:spcPct val="90000"/>
+              </a:lnSpc>
+              <a:spcBef>
+                <a:spcPct val="30000"/>
+              </a:spcBef>
+              <a:spcAft>
+                <a:spcPct val="0"/>
+              </a:spcAft>
+              <a:buClr>
+                <a:schemeClr val="tx2"/>
+              </a:buClr>
+              <a:buFont typeface="Arial" charset="0"/>
+              <a:buChar char="–"/>
+              <a:defRPr sz="1600">
+                <a:solidFill>
+                  <a:schemeClr val="tx1">
+                    <a:lumMod val="75000"/>
+                    <a:lumOff val="25000"/>
+                  </a:schemeClr>
+                </a:solidFill>
+                <a:latin typeface="+mn-lt"/>
+              </a:defRPr>
+            </a:lvl5pPr>
+            <a:lvl6pPr marL="1414463" indent="-163513" algn="l" defTabSz="820738" rtl="0" eaLnBrk="1" fontAlgn="base" hangingPunct="1">
+              <a:lnSpc>
+                <a:spcPct val="90000"/>
+              </a:lnSpc>
+              <a:spcBef>
+                <a:spcPct val="30000"/>
+              </a:spcBef>
+              <a:spcAft>
+                <a:spcPct val="0"/>
+              </a:spcAft>
+              <a:buClr>
+                <a:schemeClr val="tx2"/>
+              </a:buClr>
+              <a:buFont typeface="Arial" charset="0"/>
+              <a:buChar char="–"/>
+              <a:defRPr sz="1600">
+                <a:solidFill>
+                  <a:schemeClr val="tx1"/>
+                </a:solidFill>
+                <a:latin typeface="+mn-lt"/>
+              </a:defRPr>
+            </a:lvl6pPr>
+            <a:lvl7pPr marL="1871663" indent="-163513" algn="l" defTabSz="820738" rtl="0" eaLnBrk="1" fontAlgn="base" hangingPunct="1">
+              <a:lnSpc>
+                <a:spcPct val="90000"/>
+              </a:lnSpc>
+              <a:spcBef>
+                <a:spcPct val="30000"/>
+              </a:spcBef>
+              <a:spcAft>
+                <a:spcPct val="0"/>
+              </a:spcAft>
+              <a:buClr>
+                <a:schemeClr val="tx2"/>
+              </a:buClr>
+              <a:buFont typeface="Arial" charset="0"/>
+              <a:buChar char="–"/>
+              <a:defRPr sz="1600">
+                <a:solidFill>
+                  <a:schemeClr val="tx1"/>
+                </a:solidFill>
+                <a:latin typeface="+mn-lt"/>
+              </a:defRPr>
+            </a:lvl7pPr>
+            <a:lvl8pPr marL="2328863" indent="-163513" algn="l" defTabSz="820738" rtl="0" eaLnBrk="1" fontAlgn="base" hangingPunct="1">
+              <a:lnSpc>
+                <a:spcPct val="90000"/>
+              </a:lnSpc>
+              <a:spcBef>
+                <a:spcPct val="30000"/>
+              </a:spcBef>
+              <a:spcAft>
+                <a:spcPct val="0"/>
+              </a:spcAft>
+              <a:buClr>
+                <a:schemeClr val="tx2"/>
+              </a:buClr>
+              <a:buFont typeface="Arial" charset="0"/>
+              <a:buChar char="–"/>
+              <a:defRPr sz="1600">
+                <a:solidFill>
+                  <a:schemeClr val="tx1"/>
+                </a:solidFill>
+                <a:latin typeface="+mn-lt"/>
+              </a:defRPr>
+            </a:lvl8pPr>
+            <a:lvl9pPr marL="2786063" indent="-163513" algn="l" defTabSz="820738" rtl="0" eaLnBrk="1" fontAlgn="base" hangingPunct="1">
+              <a:lnSpc>
+                <a:spcPct val="90000"/>
+              </a:lnSpc>
+              <a:spcBef>
+                <a:spcPct val="30000"/>
+              </a:spcBef>
+              <a:spcAft>
+                <a:spcPct val="0"/>
+              </a:spcAft>
+              <a:buClr>
+                <a:schemeClr val="tx2"/>
+              </a:buClr>
+              <a:buFont typeface="Arial" charset="0"/>
+              <a:buChar char="–"/>
+              <a:defRPr sz="1600">
+                <a:solidFill>
+                  <a:schemeClr val="tx1"/>
+                </a:solidFill>
+                <a:latin typeface="+mn-lt"/>
+              </a:defRPr>
+            </a:lvl9pPr>
+          </a:lstStyle>
+          <a:p>
+            <a:r>
+              <a:rPr lang="en-US" kern="0" dirty="0" smtClean="0"/>
+              <a:t>Benefits to Industry/Enterprise</a:t>
+            </a:r>
+            <a:endParaRPr lang="en-US" kern="0" dirty="0"/>
+          </a:p>
+        </p:txBody>
+      </p:sp>
+      <p:sp>
+        <p:nvSpPr>
+          <p:cNvPr id="8" name="Content Placeholder 3"/>
+          <p:cNvSpPr txBox="1">
+            <a:spLocks/>
+          </p:cNvSpPr>
+          <p:nvPr/>
+        </p:nvSpPr>
+        <p:spPr bwMode="auto">
+          <a:xfrm>
+            <a:off x="405383" y="1705002"/>
+            <a:ext cx="5601407" cy="1329595"/>
+          </a:xfrm>
+          <a:prstGeom prst="rect">
+            <a:avLst/>
+          </a:prstGeom>
+          <a:solidFill>
+            <a:schemeClr val="tx1">
+              <a:lumMod val="75000"/>
+              <a:lumOff val="25000"/>
+            </a:schemeClr>
+          </a:solidFill>
+          <a:ln w="9525">
+            <a:noFill/>
+            <a:miter lim="800000"/>
+            <a:headEnd/>
+            <a:tailEnd/>
+          </a:ln>
+          <a:effectLst/>
+        </p:spPr>
+        <p:txBody>
+          <a:bodyPr vert="horz" wrap="square" lIns="0" tIns="0" rIns="0" bIns="0" numCol="1" anchor="t" anchorCtr="0" compatLnSpc="1">
+            <a:prstTxWarp prst="textNoShape">
+              <a:avLst/>
+            </a:prstTxWarp>
+            <a:spAutoFit/>
+          </a:bodyPr>
+          <a:lstStyle>
+            <a:lvl1pPr marL="0" indent="0" algn="l" defTabSz="820738" rtl="0" eaLnBrk="1" fontAlgn="base" hangingPunct="1">
+              <a:lnSpc>
+                <a:spcPct val="90000"/>
+              </a:lnSpc>
+              <a:spcBef>
+                <a:spcPct val="30000"/>
+              </a:spcBef>
+              <a:spcAft>
+                <a:spcPct val="0"/>
+              </a:spcAft>
+              <a:buClr>
+                <a:schemeClr val="tx2"/>
+              </a:buClr>
+              <a:buFont typeface="Symbol" panose="05050102010706020507" pitchFamily="18" charset="2"/>
+              <a:buChar char=""/>
+              <a:defRPr sz="2000" b="1">
+                <a:solidFill>
+                  <a:schemeClr val="bg1"/>
+                </a:solidFill>
+                <a:latin typeface="+mn-lt"/>
+                <a:ea typeface="+mn-ea"/>
+                <a:cs typeface="+mn-cs"/>
+              </a:defRPr>
+            </a:lvl1pPr>
+            <a:lvl2pPr marL="288925" indent="-173038" algn="l" defTabSz="820738" rtl="0" eaLnBrk="1" fontAlgn="base" hangingPunct="1">
+              <a:lnSpc>
+                <a:spcPct val="90000"/>
+              </a:lnSpc>
+              <a:spcBef>
+                <a:spcPct val="30000"/>
+              </a:spcBef>
+              <a:spcAft>
+                <a:spcPct val="0"/>
+              </a:spcAft>
+              <a:buClr>
+                <a:schemeClr val="bg1"/>
+              </a:buClr>
+              <a:buFont typeface="Arial" panose="020B0604020202020204" pitchFamily="34" charset="0"/>
+              <a:buChar char="•"/>
+              <a:defRPr sz="2000">
+                <a:solidFill>
+                  <a:schemeClr val="bg1"/>
+                </a:solidFill>
+                <a:latin typeface="+mn-lt"/>
+              </a:defRPr>
+            </a:lvl2pPr>
+            <a:lvl3pPr marL="508000" indent="-184150" algn="l" defTabSz="820738" rtl="0" eaLnBrk="1" fontAlgn="base" hangingPunct="1">
+              <a:lnSpc>
+                <a:spcPct val="90000"/>
+              </a:lnSpc>
+              <a:spcBef>
+                <a:spcPct val="30000"/>
+              </a:spcBef>
+              <a:spcAft>
+                <a:spcPct val="0"/>
+              </a:spcAft>
+              <a:buClr>
+                <a:schemeClr val="bg1"/>
+              </a:buClr>
+              <a:buFont typeface="Arial" panose="020B0604020202020204" pitchFamily="34" charset="0"/>
+              <a:buChar char="•"/>
+              <a:defRPr>
+                <a:solidFill>
+                  <a:schemeClr val="bg1"/>
+                </a:solidFill>
+                <a:latin typeface="+mn-lt"/>
+              </a:defRPr>
+            </a:lvl3pPr>
+            <a:lvl4pPr marL="803275" indent="-225425" algn="l" defTabSz="820738" rtl="0" eaLnBrk="1" fontAlgn="base" hangingPunct="1">
+              <a:lnSpc>
+                <a:spcPct val="90000"/>
+              </a:lnSpc>
+              <a:spcBef>
+                <a:spcPct val="30000"/>
+              </a:spcBef>
+              <a:spcAft>
+                <a:spcPct val="0"/>
+              </a:spcAft>
+              <a:buClr>
+                <a:schemeClr val="bg1"/>
+              </a:buClr>
+              <a:buFont typeface="Arial" panose="020B0604020202020204" pitchFamily="34" charset="0"/>
+              <a:buChar char="•"/>
+              <a:defRPr sz="1600">
+                <a:solidFill>
+                  <a:schemeClr val="bg1"/>
+                </a:solidFill>
+                <a:latin typeface="+mn-lt"/>
+              </a:defRPr>
+            </a:lvl4pPr>
+            <a:lvl5pPr marL="957263" indent="-163513" algn="l" defTabSz="820738" rtl="0" eaLnBrk="1" fontAlgn="base" hangingPunct="1">
+              <a:lnSpc>
+                <a:spcPct val="90000"/>
+              </a:lnSpc>
+              <a:spcBef>
+                <a:spcPct val="30000"/>
+              </a:spcBef>
+              <a:spcAft>
+                <a:spcPct val="0"/>
+              </a:spcAft>
+              <a:buClr>
+                <a:schemeClr val="tx2"/>
+              </a:buClr>
+              <a:buFont typeface="Arial" charset="0"/>
+              <a:buChar char="–"/>
+              <a:defRPr sz="1600">
+                <a:solidFill>
+                  <a:schemeClr val="tx1">
+                    <a:lumMod val="75000"/>
+                    <a:lumOff val="25000"/>
+                  </a:schemeClr>
+                </a:solidFill>
+                <a:latin typeface="+mn-lt"/>
+              </a:defRPr>
+            </a:lvl5pPr>
+            <a:lvl6pPr marL="1414463" indent="-163513" algn="l" defTabSz="820738" rtl="0" eaLnBrk="1" fontAlgn="base" hangingPunct="1">
+              <a:lnSpc>
+                <a:spcPct val="90000"/>
+              </a:lnSpc>
+              <a:spcBef>
+                <a:spcPct val="30000"/>
+              </a:spcBef>
+              <a:spcAft>
+                <a:spcPct val="0"/>
+              </a:spcAft>
+              <a:buClr>
+                <a:schemeClr val="tx2"/>
+              </a:buClr>
+              <a:buFont typeface="Arial" charset="0"/>
+              <a:buChar char="–"/>
+              <a:defRPr sz="1600">
+                <a:solidFill>
+                  <a:schemeClr val="tx1"/>
+                </a:solidFill>
+                <a:latin typeface="+mn-lt"/>
+              </a:defRPr>
+            </a:lvl6pPr>
+            <a:lvl7pPr marL="1871663" indent="-163513" algn="l" defTabSz="820738" rtl="0" eaLnBrk="1" fontAlgn="base" hangingPunct="1">
+              <a:lnSpc>
+                <a:spcPct val="90000"/>
+              </a:lnSpc>
+              <a:spcBef>
+                <a:spcPct val="30000"/>
+              </a:spcBef>
+              <a:spcAft>
+                <a:spcPct val="0"/>
+              </a:spcAft>
+              <a:buClr>
+                <a:schemeClr val="tx2"/>
+              </a:buClr>
+              <a:buFont typeface="Arial" charset="0"/>
+              <a:buChar char="–"/>
+              <a:defRPr sz="1600">
+                <a:solidFill>
+                  <a:schemeClr val="tx1"/>
+                </a:solidFill>
+                <a:latin typeface="+mn-lt"/>
+              </a:defRPr>
+            </a:lvl7pPr>
+            <a:lvl8pPr marL="2328863" indent="-163513" algn="l" defTabSz="820738" rtl="0" eaLnBrk="1" fontAlgn="base" hangingPunct="1">
+              <a:lnSpc>
+                <a:spcPct val="90000"/>
+              </a:lnSpc>
+              <a:spcBef>
+                <a:spcPct val="30000"/>
+              </a:spcBef>
+              <a:spcAft>
+                <a:spcPct val="0"/>
+              </a:spcAft>
+              <a:buClr>
+                <a:schemeClr val="tx2"/>
+              </a:buClr>
+              <a:buFont typeface="Arial" charset="0"/>
+              <a:buChar char="–"/>
+              <a:defRPr sz="1600">
+                <a:solidFill>
+                  <a:schemeClr val="tx1"/>
+                </a:solidFill>
+                <a:latin typeface="+mn-lt"/>
+              </a:defRPr>
+            </a:lvl8pPr>
+            <a:lvl9pPr marL="2786063" indent="-163513" algn="l" defTabSz="820738" rtl="0" eaLnBrk="1" fontAlgn="base" hangingPunct="1">
+              <a:lnSpc>
+                <a:spcPct val="90000"/>
+              </a:lnSpc>
+              <a:spcBef>
+                <a:spcPct val="30000"/>
+              </a:spcBef>
+              <a:spcAft>
+                <a:spcPct val="0"/>
+              </a:spcAft>
+              <a:buClr>
+                <a:schemeClr val="tx2"/>
+              </a:buClr>
+              <a:buFont typeface="Arial" charset="0"/>
+              <a:buChar char="–"/>
+              <a:defRPr sz="1600">
+                <a:solidFill>
+                  <a:schemeClr val="tx1"/>
+                </a:solidFill>
+                <a:latin typeface="+mn-lt"/>
+              </a:defRPr>
+            </a:lvl9pPr>
+          </a:lstStyle>
+          <a:p>
+            <a:pPr marL="285750" indent="-285750"/>
+            <a:r>
+              <a:rPr lang="en-US" sz="1600" kern="0" dirty="0" smtClean="0"/>
+              <a:t>Immediate feedback loop to detect and fix issues early</a:t>
+            </a:r>
+          </a:p>
+          <a:p>
+            <a:pPr marL="285750" indent="-285750"/>
+            <a:r>
+              <a:rPr lang="en-US" sz="1600" kern="0" dirty="0" smtClean="0"/>
+              <a:t>Increase transparency and visibility to other developers and team members </a:t>
+            </a:r>
+          </a:p>
+          <a:p>
+            <a:pPr marL="285750" indent="-285750"/>
+            <a:r>
+              <a:rPr lang="en-US" sz="1600" kern="0" dirty="0" smtClean="0"/>
+              <a:t>Avoid “integration hell”</a:t>
+            </a:r>
+          </a:p>
+          <a:p>
+            <a:pPr marL="285750" indent="-285750"/>
+            <a:r>
+              <a:rPr lang="en-US" sz="1600" kern="0" dirty="0" smtClean="0"/>
+              <a:t>Improve quality and testability</a:t>
+            </a:r>
+            <a:endParaRPr lang="en-US" sz="1600" kern="0" dirty="0"/>
           </a:p>
         </p:txBody>
       </p:sp>
     </p:spTree>
     <p:extLst>
       <p:ext uri="{BB962C8B-B14F-4D97-AF65-F5344CB8AC3E}">
-        <p14:creationId xmlns:p14="http://schemas.microsoft.com/office/powerpoint/2010/main" val="3607805654"/>
+        <p14:creationId xmlns:p14="http://schemas.microsoft.com/office/powerpoint/2010/main" val="1776094296"/>
       </p:ext>
     </p:extLst>
   </p:cSld>
@@ -8519,6 +11818,13 @@
       </p:transition>
     </mc:Fallback>
   </mc:AlternateContent>
+  <p:timing>
+    <p:tnLst>
+      <p:par>
+        <p:cTn id="1" dur="indefinite" restart="never" nodeType="tmRoot"/>
+      </p:par>
+    </p:tnLst>
+  </p:timing>
 </p:sld>
 </file>
 
@@ -8554,7 +11860,11 @@
           <a:bodyPr/>
           <a:lstStyle/>
           <a:p>
-            <a:endParaRPr lang="en-GB"/>
+            <a:r>
+              <a:rPr lang="en-GB" dirty="0" smtClean="0"/>
+              <a:t>Next Steps</a:t>
+            </a:r>
+            <a:endParaRPr lang="en-GB" dirty="0"/>
           </a:p>
         </p:txBody>
       </p:sp>
@@ -8568,12 +11878,43 @@
             <p:ph type="body" sz="quarter" idx="12"/>
           </p:nvPr>
         </p:nvSpPr>
-        <p:spPr/>
+        <p:spPr>
+          <a:xfrm>
+            <a:off x="448055" y="777240"/>
+            <a:ext cx="11311128" cy="323165"/>
+          </a:xfrm>
+        </p:spPr>
         <p:txBody>
           <a:bodyPr/>
           <a:lstStyle/>
           <a:p>
-            <a:endParaRPr lang="en-GB"/>
+            <a:r>
+              <a:rPr lang="en-US" dirty="0">
+                <a:solidFill>
+                  <a:schemeClr val="bg1">
+                    <a:lumMod val="50000"/>
+                  </a:schemeClr>
+                </a:solidFill>
+              </a:rPr>
+              <a:t>Agile for Model-Based-Standards </a:t>
+            </a:r>
+            <a:r>
+              <a:rPr lang="en-US" dirty="0" smtClean="0">
+                <a:solidFill>
+                  <a:schemeClr val="bg1">
+                    <a:lumMod val="50000"/>
+                  </a:schemeClr>
+                </a:solidFill>
+              </a:rPr>
+              <a:t>Development</a:t>
+            </a:r>
+            <a:endParaRPr lang="en-US" dirty="0">
+              <a:solidFill>
+                <a:schemeClr val="bg1">
+                  <a:lumMod val="50000"/>
+                </a:schemeClr>
+              </a:solidFill>
+            </a:endParaRPr>
           </a:p>
         </p:txBody>
       </p:sp>
@@ -8587,19 +11928,37 @@
             <p:ph sz="quarter" idx="16"/>
           </p:nvPr>
         </p:nvSpPr>
-        <p:spPr/>
+        <p:spPr>
+          <a:xfrm>
+            <a:off x="405383" y="1283208"/>
+            <a:ext cx="11311128" cy="1015663"/>
+          </a:xfrm>
+        </p:spPr>
         <p:txBody>
           <a:bodyPr/>
           <a:lstStyle/>
           <a:p>
-            <a:endParaRPr lang="en-GB"/>
+            <a:r>
+              <a:rPr lang="en-GB" dirty="0" smtClean="0"/>
+              <a:t>Implement:</a:t>
+            </a:r>
+          </a:p>
+          <a:p>
+            <a:endParaRPr lang="en-GB" dirty="0"/>
+          </a:p>
+          <a:p>
+            <a:r>
+              <a:rPr lang="en-GB" dirty="0" smtClean="0"/>
+              <a:t>Continued Research:</a:t>
+            </a:r>
+            <a:endParaRPr lang="en-GB" dirty="0"/>
           </a:p>
         </p:txBody>
       </p:sp>
     </p:spTree>
     <p:extLst>
       <p:ext uri="{BB962C8B-B14F-4D97-AF65-F5344CB8AC3E}">
-        <p14:creationId xmlns:p14="http://schemas.microsoft.com/office/powerpoint/2010/main" val="1809149319"/>
+        <p14:creationId xmlns:p14="http://schemas.microsoft.com/office/powerpoint/2010/main" val="3607805654"/>
       </p:ext>
     </p:extLst>
   </p:cSld>
@@ -8618,6 +11977,13 @@
       </p:transition>
     </mc:Fallback>
   </mc:AlternateContent>
+  <p:timing>
+    <p:tnLst>
+      <p:par>
+        <p:cTn id="1" dur="indefinite" restart="never" nodeType="tmRoot"/>
+      </p:par>
+    </p:tnLst>
+  </p:timing>
 </p:sld>
 </file>
 
@@ -9620,12 +12986,6 @@
 </file>
 
 <file path=customXml/item2.xml><?xml version="1.0" encoding="utf-8"?>
-<p:properties xmlns:p="http://schemas.microsoft.com/office/2006/metadata/properties" xmlns:xsi="http://www.w3.org/2001/XMLSchema-instance" xmlns:pc="http://schemas.microsoft.com/office/infopath/2007/PartnerControls">
-  <documentManagement/>
-</p:properties>
-</file>
-
-<file path=customXml/item3.xml><?xml version="1.0" encoding="utf-8"?>
 <ct:contentTypeSchema xmlns:ct="http://schemas.microsoft.com/office/2006/metadata/contentType" xmlns:ma="http://schemas.microsoft.com/office/2006/metadata/properties/metaAttributes" ct:_="" ma:_="" ma:contentTypeName="Document" ma:contentTypeID="0x010100B928359CC7305D47809A6E4D09895B12" ma:contentTypeVersion="0" ma:contentTypeDescription="Create a new document." ma:contentTypeScope="" ma:versionID="58734b0d5d00aaa9ecfcecd44c708e1b">
   <xsd:schema xmlns:xsd="http://www.w3.org/2001/XMLSchema" xmlns:xs="http://www.w3.org/2001/XMLSchema" xmlns:p="http://schemas.microsoft.com/office/2006/metadata/properties" targetNamespace="http://schemas.microsoft.com/office/2006/metadata/properties" ma:root="true" ma:fieldsID="1b05d82d297216baf5b26c55225140df">
     <xsd:element name="properties">
@@ -9739,6 +13099,12 @@
 </ct:contentTypeSchema>
 </file>
 
+<file path=customXml/item3.xml><?xml version="1.0" encoding="utf-8"?>
+<p:properties xmlns:p="http://schemas.microsoft.com/office/2006/metadata/properties" xmlns:xsi="http://www.w3.org/2001/XMLSchema-instance" xmlns:pc="http://schemas.microsoft.com/office/infopath/2007/PartnerControls">
+  <documentManagement/>
+</p:properties>
+</file>
+
 <file path=customXml/itemProps1.xml><?xml version="1.0" encoding="utf-8"?>
 <ds:datastoreItem xmlns:ds="http://schemas.openxmlformats.org/officeDocument/2006/customXml" ds:itemID="{16D4C100-0EDD-4DD2-914D-A957225F12B9}">
   <ds:schemaRefs>
@@ -9748,21 +13114,6 @@
 </file>
 
 <file path=customXml/itemProps2.xml><?xml version="1.0" encoding="utf-8"?>
-<ds:datastoreItem xmlns:ds="http://schemas.openxmlformats.org/officeDocument/2006/customXml" ds:itemID="{C691D66D-CA73-4591-BA35-882D4C096123}">
-  <ds:schemaRefs>
-    <ds:schemaRef ds:uri="http://schemas.microsoft.com/office/2006/metadata/properties"/>
-    <ds:schemaRef ds:uri="http://purl.org/dc/terms/"/>
-    <ds:schemaRef ds:uri="http://schemas.openxmlformats.org/package/2006/metadata/core-properties"/>
-    <ds:schemaRef ds:uri="http://schemas.microsoft.com/office/2006/documentManagement/types"/>
-    <ds:schemaRef ds:uri="http://schemas.microsoft.com/office/infopath/2007/PartnerControls"/>
-    <ds:schemaRef ds:uri="http://purl.org/dc/elements/1.1/"/>
-    <ds:schemaRef ds:uri="http://www.w3.org/XML/1998/namespace"/>
-    <ds:schemaRef ds:uri="http://purl.org/dc/dcmitype/"/>
-  </ds:schemaRefs>
-</ds:datastoreItem>
-</file>
-
-<file path=customXml/itemProps3.xml><?xml version="1.0" encoding="utf-8"?>
 <ds:datastoreItem xmlns:ds="http://schemas.openxmlformats.org/officeDocument/2006/customXml" ds:itemID="{FFB024C0-3292-4B7C-9F10-F14F1C85528A}">
   <ds:schemaRefs>
     <ds:schemaRef ds:uri="http://schemas.microsoft.com/office/2006/metadata/contentType"/>
@@ -9776,4 +13127,19 @@
     <ds:schemaRef ds:uri="http://schemas.microsoft.com/office/infopath/2007/PartnerControls"/>
   </ds:schemaRefs>
 </ds:datastoreItem>
+</file>
+
+<file path=customXml/itemProps3.xml><?xml version="1.0" encoding="utf-8"?>
+<ds:datastoreItem xmlns:ds="http://schemas.openxmlformats.org/officeDocument/2006/customXml" ds:itemID="{C691D66D-CA73-4591-BA35-882D4C096123}">
+  <ds:schemaRefs>
+    <ds:schemaRef ds:uri="http://purl.org/dc/terms/"/>
+    <ds:schemaRef ds:uri="http://schemas.openxmlformats.org/package/2006/metadata/core-properties"/>
+    <ds:schemaRef ds:uri="http://purl.org/dc/dcmitype/"/>
+    <ds:schemaRef ds:uri="http://schemas.microsoft.com/office/infopath/2007/PartnerControls"/>
+    <ds:schemaRef ds:uri="http://purl.org/dc/elements/1.1/"/>
+    <ds:schemaRef ds:uri="http://schemas.microsoft.com/office/2006/documentManagement/types"/>
+    <ds:schemaRef ds:uri="http://schemas.microsoft.com/office/2006/metadata/properties"/>
+    <ds:schemaRef ds:uri="http://www.w3.org/XML/1998/namespace"/>
+  </ds:schemaRefs>
+</ds:datastoreItem>
 </file>
</xml_diff>

<commit_message>
Updates from today's meeting
</commit_message>
<xml_diff>
--- a/01 - Agile for Model-Based Standards Development/D - Presentations/PDES.Presentation.pptx
+++ b/01 - Agile for Model-Based Standards Development/D - Presentations/PDES.Presentation.pptx
@@ -293,7 +293,7 @@
             <a:fld id="{BE4E05A4-29A6-45AB-82C9-31FC81F0251A}" type="datetimeFigureOut">
               <a:rPr lang="en-US" smtClean="0"/>
               <a:pPr/>
-              <a:t>9/5/19</a:t>
+              <a:t>9/5/2019</a:t>
             </a:fld>
             <a:endParaRPr lang="en-US" dirty="0"/>
           </a:p>
@@ -12231,7 +12231,7 @@
         <p:spPr>
           <a:xfrm>
             <a:off x="405383" y="1283208"/>
-            <a:ext cx="11311128" cy="4191917"/>
+            <a:ext cx="11311128" cy="4450449"/>
           </a:xfrm>
         </p:spPr>
         <p:txBody>
@@ -12282,8 +12282,28 @@
             </a:r>
             <a:r>
               <a:rPr lang="en-US" sz="1400" b="0" dirty="0"/>
-              <a:t>change during the development cycle</a:t>
-            </a:r>
+              <a:t>change during the development </a:t>
+            </a:r>
+            <a:r>
+              <a:rPr lang="en-US" sz="1400" b="0" dirty="0" smtClean="0"/>
+              <a:t>cycle</a:t>
+            </a:r>
+          </a:p>
+          <a:p>
+            <a:pPr marL="850900" lvl="2" indent="-342900"/>
+            <a:r>
+              <a:rPr lang="en-US" sz="1400" dirty="0" smtClean="0"/>
+              <a:t>Requirement to be structured/semantic and computer interpretable for automation optimization (i.e. </a:t>
+            </a:r>
+            <a:r>
+              <a:rPr lang="en-US" sz="1400" dirty="0" err="1" smtClean="0"/>
+              <a:t>Req</a:t>
+            </a:r>
+            <a:r>
+              <a:rPr lang="en-US" sz="1400" dirty="0" smtClean="0"/>
+              <a:t>-IF)</a:t>
+            </a:r>
+            <a:endParaRPr lang="en-US" sz="1400" b="0" dirty="0"/>
           </a:p>
           <a:p>
             <a:pPr marL="631825" lvl="1" indent="-342900"/>
@@ -12532,7 +12552,7 @@
         <p:spPr>
           <a:xfrm>
             <a:off x="405383" y="1283208"/>
-            <a:ext cx="11311128" cy="4736681"/>
+            <a:ext cx="11311128" cy="4921347"/>
           </a:xfrm>
         </p:spPr>
         <p:txBody>
@@ -12646,7 +12666,18 @@
             <a:pPr marL="850900" lvl="2" indent="-342900"/>
             <a:r>
               <a:rPr lang="en-US" sz="1400" dirty="0"/>
-              <a:t>Minutes traceability to requirements and tasks</a:t>
+              <a:t>Minutes traceability to requirements and </a:t>
+            </a:r>
+            <a:r>
+              <a:rPr lang="en-US" sz="1400" dirty="0" smtClean="0"/>
+              <a:t>tasks</a:t>
+            </a:r>
+          </a:p>
+          <a:p>
+            <a:pPr marL="850900" lvl="2" indent="-342900"/>
+            <a:r>
+              <a:rPr lang="en-US" sz="1400" dirty="0" smtClean="0"/>
+              <a:t>Supports report generation, automation, and single source of truth</a:t>
             </a:r>
             <a:endParaRPr lang="en-US" sz="1200" dirty="0"/>
           </a:p>
@@ -12849,6 +12880,9 @@
           <a:lstStyle/>
           <a:p>
             <a:pPr marL="342900" indent="-342900">
+              <a:buClr>
+                <a:schemeClr val="bg1"/>
+              </a:buClr>
               <a:buFont typeface="Arial" panose="020B0604020202020204" pitchFamily="34" charset="0"/>
               <a:buChar char="•"/>
             </a:pPr>
@@ -14327,7 +14361,7 @@
         <p:spPr>
           <a:xfrm>
             <a:off x="405383" y="1400438"/>
-            <a:ext cx="11311128" cy="5336846"/>
+            <a:ext cx="11311128" cy="5244513"/>
           </a:xfrm>
         </p:spPr>
         <p:txBody>
@@ -14340,7 +14374,7 @@
               </a:buClr>
             </a:pPr>
             <a:r>
-              <a:rPr lang="en-GB" sz="2800" u="sng" dirty="0"/>
+              <a:rPr lang="en-GB" sz="2400" u="sng" dirty="0"/>
               <a:t>Implement:</a:t>
             </a:r>
           </a:p>
@@ -14352,7 +14386,7 @@
               <a:buNone/>
             </a:pPr>
             <a:r>
-              <a:rPr lang="en-GB" b="0" dirty="0"/>
+              <a:rPr lang="en-GB" sz="1800" b="0" dirty="0"/>
               <a:t>Backlog Management</a:t>
             </a:r>
           </a:p>
@@ -14362,7 +14396,7 @@
               <a:buChar char="§"/>
             </a:pPr>
             <a:r>
-              <a:rPr lang="en-GB" dirty="0"/>
+              <a:rPr lang="en-GB" sz="1800" dirty="0"/>
               <a:t>JIRA or GIT KANBANs</a:t>
             </a:r>
           </a:p>
@@ -14374,7 +14408,7 @@
               <a:buNone/>
             </a:pPr>
             <a:r>
-              <a:rPr lang="en-GB" b="0" dirty="0"/>
+              <a:rPr lang="en-GB" sz="1800" b="0" dirty="0"/>
               <a:t>Agile Release Train</a:t>
             </a:r>
           </a:p>
@@ -14384,10 +14418,10 @@
               <a:buChar char="§"/>
             </a:pPr>
             <a:r>
-              <a:rPr lang="en-GB" dirty="0"/>
+              <a:rPr lang="en-GB" sz="1800" dirty="0"/>
               <a:t>JIRA Workflow Management</a:t>
             </a:r>
-            <a:endParaRPr lang="en-GB" b="0" dirty="0"/>
+            <a:endParaRPr lang="en-GB" sz="1800" b="0" dirty="0"/>
           </a:p>
           <a:p>
             <a:pPr>
@@ -14397,7 +14431,7 @@
               <a:buNone/>
             </a:pPr>
             <a:r>
-              <a:rPr lang="en-GB" b="0" dirty="0"/>
+              <a:rPr lang="en-GB" sz="1800" b="0" dirty="0"/>
               <a:t>Program Increment Planning</a:t>
             </a:r>
           </a:p>
@@ -14407,7 +14441,7 @@
               <a:buChar char="§"/>
             </a:pPr>
             <a:r>
-              <a:rPr lang="en-GB" b="0" dirty="0"/>
+              <a:rPr lang="en-GB" sz="1800" b="0" dirty="0"/>
               <a:t>JIRA Workflow Management</a:t>
             </a:r>
           </a:p>
@@ -14417,10 +14451,10 @@
               <a:buChar char="§"/>
             </a:pPr>
             <a:r>
-              <a:rPr lang="en-US" dirty="0"/>
+              <a:rPr lang="en-US" sz="1800" dirty="0"/>
               <a:t>Planning Poker, T-Shirt Sizes, Dot Voting </a:t>
             </a:r>
-            <a:endParaRPr lang="en-GB" b="0" dirty="0"/>
+            <a:endParaRPr lang="en-GB" sz="1800" b="0" dirty="0"/>
           </a:p>
           <a:p>
             <a:pPr marL="342900" indent="-342900">
@@ -14430,7 +14464,7 @@
               <a:buFont typeface="Wingdings" panose="05000000000000000000" pitchFamily="2" charset="2"/>
               <a:buChar char="§"/>
             </a:pPr>
-            <a:endParaRPr lang="en-GB" dirty="0"/>
+            <a:endParaRPr lang="en-GB" sz="1800" dirty="0"/>
           </a:p>
           <a:p>
             <a:pPr>
@@ -14439,7 +14473,7 @@
               </a:buClr>
             </a:pPr>
             <a:r>
-              <a:rPr lang="en-GB" sz="2800" u="sng" dirty="0"/>
+              <a:rPr lang="en-GB" sz="2400" u="sng" dirty="0"/>
               <a:t>Continued Research:</a:t>
             </a:r>
           </a:p>
@@ -14452,11 +14486,11 @@
               <a:buChar char="§"/>
             </a:pPr>
             <a:r>
-              <a:rPr lang="en-GB" b="0" dirty="0"/>
+              <a:rPr lang="en-GB" sz="1800" b="0" dirty="0"/>
               <a:t>Advanced Communication Tools </a:t>
             </a:r>
             <a:r>
-              <a:rPr lang="en-GB" sz="1600" b="0" dirty="0"/>
+              <a:rPr lang="en-GB" sz="1400" b="0" dirty="0"/>
               <a:t>(for consensus management; requirements traceability)</a:t>
             </a:r>
           </a:p>
@@ -14469,38 +14503,38 @@
               <a:buChar char="§"/>
             </a:pPr>
             <a:r>
-              <a:rPr lang="en-GB" b="0" dirty="0"/>
+              <a:rPr lang="en-GB" sz="1800" b="0" dirty="0"/>
               <a:t>Continuous Integration Tools &amp; Automation </a:t>
             </a:r>
             <a:r>
-              <a:rPr lang="en-GB" sz="1600" b="0" dirty="0"/>
+              <a:rPr lang="en-GB" sz="1400" b="0" dirty="0"/>
               <a:t>(</a:t>
             </a:r>
             <a:r>
-              <a:rPr lang="en-US" sz="1600" b="0" dirty="0" err="1"/>
+              <a:rPr lang="en-US" sz="1400" b="0" dirty="0" err="1"/>
               <a:t>Bitbucket</a:t>
             </a:r>
             <a:r>
-              <a:rPr lang="en-US" sz="1600" b="0" dirty="0"/>
+              <a:rPr lang="en-US" sz="1400" b="0" dirty="0"/>
               <a:t>/Bamboo, Jenkins, AWS </a:t>
             </a:r>
             <a:r>
-              <a:rPr lang="en-US" sz="1600" b="0" dirty="0" err="1"/>
+              <a:rPr lang="en-US" sz="1400" b="0" dirty="0" err="1"/>
               <a:t>CodePipeline</a:t>
             </a:r>
             <a:r>
-              <a:rPr lang="en-US" sz="1600" b="0" dirty="0"/>
+              <a:rPr lang="en-US" sz="1400" b="0" dirty="0"/>
               <a:t>, and </a:t>
             </a:r>
             <a:r>
-              <a:rPr lang="en-US" sz="1600" b="0" dirty="0" err="1"/>
+              <a:rPr lang="en-US" sz="1400" b="0" dirty="0" err="1"/>
               <a:t>Gitlab</a:t>
             </a:r>
             <a:r>
-              <a:rPr lang="en-US" sz="1600" b="0" dirty="0"/>
+              <a:rPr lang="en-US" sz="1400" b="0" dirty="0"/>
               <a:t>)</a:t>
             </a:r>
-            <a:endParaRPr lang="en-US" b="0" dirty="0"/>
+            <a:endParaRPr lang="en-US" sz="1800" b="0" dirty="0"/>
           </a:p>
           <a:p>
             <a:pPr marL="631825" lvl="1" indent="-342900">
@@ -14508,10 +14542,27 @@
               <a:buChar char="§"/>
             </a:pPr>
             <a:r>
-              <a:rPr lang="en-US" dirty="0"/>
-              <a:t>EXPRESS Engine, JSDAI Compiles, Python scripts or ANT Builds</a:t>
-            </a:r>
-            <a:endParaRPr lang="en-GB" b="0" dirty="0"/>
+              <a:rPr lang="en-US" sz="1800" dirty="0"/>
+              <a:t>EXPRESS Engine, JSDAI Compiles, Python scripts or ANT </a:t>
+            </a:r>
+            <a:r>
+              <a:rPr lang="en-US" sz="1800" dirty="0" smtClean="0"/>
+              <a:t>Builds</a:t>
+            </a:r>
+          </a:p>
+          <a:p>
+            <a:pPr marL="342900" indent="-342900">
+              <a:buClr>
+                <a:schemeClr val="bg1"/>
+              </a:buClr>
+              <a:buFont typeface="Wingdings" panose="05000000000000000000" pitchFamily="2" charset="2"/>
+              <a:buChar char="§"/>
+            </a:pPr>
+            <a:r>
+              <a:rPr lang="en-US" sz="1800" b="0" dirty="0" smtClean="0"/>
+              <a:t>Draft presentation distributed end of September</a:t>
+            </a:r>
+            <a:endParaRPr lang="en-GB" sz="1800" b="0" dirty="0"/>
           </a:p>
           <a:p>
             <a:pPr marL="342900" indent="-342900">
@@ -14547,7 +14598,7 @@
           <a:graphicData uri="http://schemas.openxmlformats.org/presentationml/2006/ole">
             <mc:AlternateContent xmlns:mc="http://schemas.openxmlformats.org/markup-compatibility/2006">
               <mc:Choice xmlns:v="urn:schemas-microsoft-com:vml" Requires="v">
-                <p:oleObj spid="_x0000_s2080" name="Visio" r:id="rId3" imgW="5467350" imgH="3819396" progId="Visio.Drawing.15">
+                <p:oleObj spid="_x0000_s2083" name="Visio" r:id="rId3" imgW="5467350" imgH="3819396" progId="Visio.Drawing.15">
                   <p:embed/>
                 </p:oleObj>
               </mc:Choice>
@@ -15453,15 +15504,7 @@
             <a:pPr lvl="3"/>
             <a:r>
               <a:rPr lang="en-US" dirty="0"/>
-              <a:t>Story: Implicit/Simplified </a:t>
-            </a:r>
-            <a:r>
-              <a:rPr lang="en-US" dirty="0" err="1"/>
-              <a:t>Counterdrill</a:t>
-            </a:r>
-            <a:r>
-              <a:rPr lang="en-US" dirty="0"/>
-              <a:t> Hole</a:t>
+              <a:t>Story: Implicit/Simplified Counterdrill Hole</a:t>
             </a:r>
           </a:p>
           <a:p>
@@ -15566,7 +15609,7 @@
           <p:nvPr/>
         </p:nvPicPr>
         <p:blipFill>
-          <a:blip r:embed="rId2">
+          <a:blip r:embed="rId2" cstate="print">
             <a:extLst>
               <a:ext uri="{28A0092B-C50C-407E-A947-70E740481C1C}">
                 <a14:useLocalDpi xmlns:a14="http://schemas.microsoft.com/office/drawing/2010/main" val="0"/>
@@ -19178,6 +19221,12 @@
 </file>
 
 <file path=customXml/item1.xml><?xml version="1.0" encoding="utf-8"?>
+<p:properties xmlns:p="http://schemas.microsoft.com/office/2006/metadata/properties" xmlns:xsi="http://www.w3.org/2001/XMLSchema-instance" xmlns:pc="http://schemas.microsoft.com/office/infopath/2007/PartnerControls">
+  <documentManagement/>
+</p:properties>
+</file>
+
+<file path=customXml/item2.xml><?xml version="1.0" encoding="utf-8"?>
 <ct:contentTypeSchema xmlns:ct="http://schemas.microsoft.com/office/2006/metadata/contentType" xmlns:ma="http://schemas.microsoft.com/office/2006/metadata/properties/metaAttributes" ct:_="" ma:_="" ma:contentTypeName="Document" ma:contentTypeID="0x010100B928359CC7305D47809A6E4D09895B12" ma:contentTypeVersion="0" ma:contentTypeDescription="Create a new document." ma:contentTypeScope="" ma:versionID="58734b0d5d00aaa9ecfcecd44c708e1b">
   <xsd:schema xmlns:xsd="http://www.w3.org/2001/XMLSchema" xmlns:xs="http://www.w3.org/2001/XMLSchema" xmlns:p="http://schemas.microsoft.com/office/2006/metadata/properties" targetNamespace="http://schemas.microsoft.com/office/2006/metadata/properties" ma:root="true" ma:fieldsID="1b05d82d297216baf5b26c55225140df">
     <xsd:element name="properties">
@@ -19291,12 +19340,6 @@
 </ct:contentTypeSchema>
 </file>
 
-<file path=customXml/item2.xml><?xml version="1.0" encoding="utf-8"?>
-<p:properties xmlns:p="http://schemas.microsoft.com/office/2006/metadata/properties" xmlns:xsi="http://www.w3.org/2001/XMLSchema-instance" xmlns:pc="http://schemas.microsoft.com/office/infopath/2007/PartnerControls">
-  <documentManagement/>
-</p:properties>
-</file>
-
 <file path=customXml/item3.xml><?xml version="1.0" encoding="utf-8"?>
 <?mso-contentType ?>
 <FormTemplates xmlns="http://schemas.microsoft.com/sharepoint/v3/contenttype/forms">
@@ -19307,6 +19350,21 @@
 </file>
 
 <file path=customXml/itemProps1.xml><?xml version="1.0" encoding="utf-8"?>
+<ds:datastoreItem xmlns:ds="http://schemas.openxmlformats.org/officeDocument/2006/customXml" ds:itemID="{C691D66D-CA73-4591-BA35-882D4C096123}">
+  <ds:schemaRefs>
+    <ds:schemaRef ds:uri="http://purl.org/dc/elements/1.1/"/>
+    <ds:schemaRef ds:uri="http://schemas.microsoft.com/office/2006/metadata/properties"/>
+    <ds:schemaRef ds:uri="http://schemas.microsoft.com/office/2006/documentManagement/types"/>
+    <ds:schemaRef ds:uri="http://purl.org/dc/terms/"/>
+    <ds:schemaRef ds:uri="http://schemas.openxmlformats.org/package/2006/metadata/core-properties"/>
+    <ds:schemaRef ds:uri="http://purl.org/dc/dcmitype/"/>
+    <ds:schemaRef ds:uri="http://schemas.microsoft.com/office/infopath/2007/PartnerControls"/>
+    <ds:schemaRef ds:uri="http://www.w3.org/XML/1998/namespace"/>
+  </ds:schemaRefs>
+</ds:datastoreItem>
+</file>
+
+<file path=customXml/itemProps2.xml><?xml version="1.0" encoding="utf-8"?>
 <ds:datastoreItem xmlns:ds="http://schemas.openxmlformats.org/officeDocument/2006/customXml" ds:itemID="{FFB024C0-3292-4B7C-9F10-F14F1C85528A}">
   <ds:schemaRefs>
     <ds:schemaRef ds:uri="http://schemas.microsoft.com/office/2006/metadata/contentType"/>
@@ -19322,21 +19380,6 @@
 </ds:datastoreItem>
 </file>
 
-<file path=customXml/itemProps2.xml><?xml version="1.0" encoding="utf-8"?>
-<ds:datastoreItem xmlns:ds="http://schemas.openxmlformats.org/officeDocument/2006/customXml" ds:itemID="{C691D66D-CA73-4591-BA35-882D4C096123}">
-  <ds:schemaRefs>
-    <ds:schemaRef ds:uri="http://purl.org/dc/terms/"/>
-    <ds:schemaRef ds:uri="http://schemas.openxmlformats.org/package/2006/metadata/core-properties"/>
-    <ds:schemaRef ds:uri="http://purl.org/dc/dcmitype/"/>
-    <ds:schemaRef ds:uri="http://schemas.microsoft.com/office/2006/documentManagement/types"/>
-    <ds:schemaRef ds:uri="http://purl.org/dc/elements/1.1/"/>
-    <ds:schemaRef ds:uri="http://schemas.microsoft.com/office/2006/metadata/properties"/>
-    <ds:schemaRef ds:uri="http://schemas.microsoft.com/office/infopath/2007/PartnerControls"/>
-    <ds:schemaRef ds:uri="http://www.w3.org/XML/1998/namespace"/>
-  </ds:schemaRefs>
-</ds:datastoreItem>
-</file>
-
 <file path=customXml/itemProps3.xml><?xml version="1.0" encoding="utf-8"?>
 <ds:datastoreItem xmlns:ds="http://schemas.openxmlformats.org/officeDocument/2006/customXml" ds:itemID="{16D4C100-0EDD-4DD2-914D-A957225F12B9}">
   <ds:schemaRefs>

</xml_diff>